<commit_message>
- aanpassingen op de presentatie
</commit_message>
<xml_diff>
--- a/doc/GegevensVergelijker.pptx
+++ b/doc/GegevensVergelijker.pptx
@@ -11,8 +11,8 @@
     <p:sldId id="256" r:id="rId2"/>
     <p:sldId id="257" r:id="rId3"/>
     <p:sldId id="258" r:id="rId4"/>
-    <p:sldId id="259" r:id="rId5"/>
-    <p:sldId id="260" r:id="rId6"/>
+    <p:sldId id="260" r:id="rId5"/>
+    <p:sldId id="259" r:id="rId6"/>
     <p:sldId id="261" r:id="rId7"/>
     <p:sldId id="263" r:id="rId8"/>
     <p:sldId id="266" r:id="rId9"/>
@@ -118,7 +118,7 @@
   </p:defaultTextStyle>
   <p:extLst>
     <p:ext uri="{EFAFB233-063F-42B5-8137-9DF3F51BA10A}">
-      <p15:sldGuideLst xmlns:p15="http://schemas.microsoft.com/office/powerpoint/2012/main" xmlns="">
+      <p15:sldGuideLst xmlns:p15="http://schemas.microsoft.com/office/powerpoint/2012/main">
         <p15:guide id="1" orient="horz" pos="2160">
           <p15:clr>
             <a:srgbClr val="A4A3A4"/>
@@ -528,6 +528,43 @@
           <a:bodyPr/>
           <a:lstStyle/>
           <a:p>
+            <a:r>
+              <a:rPr lang="nl-NL" dirty="0"/>
+              <a:t>Welkom</a:t>
+            </a:r>
+            <a:r>
+              <a:rPr lang="nl-NL" baseline="0" dirty="0"/>
+              <a:t>,</a:t>
+            </a:r>
+          </a:p>
+          <a:p>
+            <a:r>
+              <a:rPr lang="nl-NL" baseline="0" dirty="0"/>
+              <a:t>Allereerst wil ik Wim bedanken de uitnodiging om hier mijn verhaal te doen.</a:t>
+            </a:r>
+          </a:p>
+          <a:p>
+            <a:r>
+              <a:rPr lang="nl-NL" baseline="0" dirty="0"/>
+              <a:t>Mijn naam is Eduard Witteveen en ik ben sinds 5 jaar gegevensbeheerder bij SWF</a:t>
+            </a:r>
+          </a:p>
+          <a:p>
+            <a:endParaRPr lang="nl-NL" baseline="0" dirty="0"/>
+          </a:p>
+          <a:p>
+            <a:r>
+              <a:rPr lang="nl-NL" baseline="0" dirty="0"/>
+              <a:t>Ik wil graag wat vertellen over onze gegevensvergelijker, hiermee houden wij grip op het gebruik van gegevens binnen onze organisatie.</a:t>
+            </a:r>
+          </a:p>
+          <a:p>
+            <a:endParaRPr lang="nl-NL" baseline="0" dirty="0"/>
+          </a:p>
+          <a:p>
+            <a:endParaRPr lang="nl-NL" dirty="0"/>
+          </a:p>
+          <a:p>
             <a:endParaRPr lang="nl-NL" dirty="0"/>
           </a:p>
         </p:txBody>
@@ -559,6 +596,145 @@
     <p:extLst>
       <p:ext uri="{BB962C8B-B14F-4D97-AF65-F5344CB8AC3E}">
         <p14:creationId xmlns:p14="http://schemas.microsoft.com/office/powerpoint/2010/main" val="2924087266"/>
+      </p:ext>
+    </p:extLst>
+  </p:cSld>
+  <p:clrMapOvr>
+    <a:masterClrMapping/>
+  </p:clrMapOvr>
+</p:notes>
+</file>
+
+<file path=ppt/notesSlides/notesSlide10.xml><?xml version="1.0" encoding="utf-8"?>
+<p:notes xmlns:a="http://schemas.openxmlformats.org/drawingml/2006/main" xmlns:r="http://schemas.openxmlformats.org/officeDocument/2006/relationships" xmlns:p="http://schemas.openxmlformats.org/presentationml/2006/main">
+  <p:cSld>
+    <p:spTree>
+      <p:nvGrpSpPr>
+        <p:cNvPr id="1" name=""/>
+        <p:cNvGrpSpPr/>
+        <p:nvPr/>
+      </p:nvGrpSpPr>
+      <p:grpSpPr>
+        <a:xfrm>
+          <a:off x="0" y="0"/>
+          <a:ext cx="0" cy="0"/>
+          <a:chOff x="0" y="0"/>
+          <a:chExt cx="0" cy="0"/>
+        </a:xfrm>
+      </p:grpSpPr>
+      <p:sp>
+        <p:nvSpPr>
+          <p:cNvPr id="2" name="Tijdelijke aanduiding voor dia-afbeelding 1"/>
+          <p:cNvSpPr>
+            <a:spLocks noGrp="1" noRot="1" noChangeAspect="1"/>
+          </p:cNvSpPr>
+          <p:nvPr>
+            <p:ph type="sldImg"/>
+          </p:nvPr>
+        </p:nvSpPr>
+        <p:spPr/>
+      </p:sp>
+      <p:sp>
+        <p:nvSpPr>
+          <p:cNvPr id="3" name="Tijdelijke aanduiding voor notities 2"/>
+          <p:cNvSpPr>
+            <a:spLocks noGrp="1"/>
+          </p:cNvSpPr>
+          <p:nvPr>
+            <p:ph type="body" idx="1"/>
+          </p:nvPr>
+        </p:nvSpPr>
+        <p:spPr/>
+        <p:txBody>
+          <a:bodyPr/>
+          <a:lstStyle/>
+          <a:p>
+            <a:pPr marL="171450" indent="-171450">
+              <a:buFontTx/>
+              <a:buChar char="-"/>
+            </a:pPr>
+            <a:r>
+              <a:rPr lang="nl-NL" dirty="0"/>
+              <a:t>Graag wil ik onze kwaliteit</a:t>
+            </a:r>
+            <a:r>
+              <a:rPr lang="nl-NL" baseline="0" dirty="0"/>
+              <a:t> van de gegevens delen met andere gemeenten, ik wil deze benchmarking gebruiken om zo een gevoel te krijgen of we niet te weinig of te veel aandacht aan bepaalde registraties besteden.</a:t>
+            </a:r>
+          </a:p>
+          <a:p>
+            <a:pPr marL="171450" indent="-171450">
+              <a:buFontTx/>
+              <a:buChar char="-"/>
+            </a:pPr>
+            <a:r>
+              <a:rPr lang="nl-NL" baseline="0" dirty="0"/>
+              <a:t>Om dit goed te vergelijken om dezelfde vergelijkingen te gebruiken</a:t>
+            </a:r>
+          </a:p>
+          <a:p>
+            <a:pPr marL="171450" indent="-171450">
+              <a:buFontTx/>
+              <a:buChar char="-"/>
+            </a:pPr>
+            <a:r>
+              <a:rPr lang="nl-NL" baseline="0" dirty="0"/>
+              <a:t>Het is ook belangrijk om deze vergelijkingen te doen</a:t>
+            </a:r>
+          </a:p>
+          <a:p>
+            <a:pPr marL="0" indent="0">
+              <a:buFontTx/>
+              <a:buNone/>
+            </a:pPr>
+            <a:endParaRPr lang="nl-NL" baseline="0" dirty="0"/>
+          </a:p>
+          <a:p>
+            <a:pPr marL="0" indent="0">
+              <a:buFontTx/>
+              <a:buNone/>
+            </a:pPr>
+            <a:r>
+              <a:rPr lang="nl-NL" baseline="0" dirty="0"/>
+              <a:t>Ik wil dus graag andere gemeenten vragen om dit ook te doen en ik wil vragen of KING me hiermee kan helpen.</a:t>
+            </a:r>
+          </a:p>
+          <a:p>
+            <a:pPr marL="171450" indent="-171450">
+              <a:buFontTx/>
+              <a:buChar char="-"/>
+            </a:pPr>
+            <a:endParaRPr lang="nl-NL" dirty="0"/>
+          </a:p>
+        </p:txBody>
+      </p:sp>
+      <p:sp>
+        <p:nvSpPr>
+          <p:cNvPr id="4" name="Tijdelijke aanduiding voor dianummer 3"/>
+          <p:cNvSpPr>
+            <a:spLocks noGrp="1"/>
+          </p:cNvSpPr>
+          <p:nvPr>
+            <p:ph type="sldNum" sz="quarter" idx="10"/>
+          </p:nvPr>
+        </p:nvSpPr>
+        <p:spPr/>
+        <p:txBody>
+          <a:bodyPr/>
+          <a:lstStyle/>
+          <a:p>
+            <a:fld id="{BD72EC12-EE16-490E-9213-0A8A2517DDEC}" type="slidenum">
+              <a:rPr lang="nl-NL" smtClean="0"/>
+              <a:t>10</a:t>
+            </a:fld>
+            <a:endParaRPr lang="nl-NL"/>
+          </a:p>
+        </p:txBody>
+      </p:sp>
+    </p:spTree>
+    <p:extLst>
+      <p:ext uri="{BB962C8B-B14F-4D97-AF65-F5344CB8AC3E}">
+        <p14:creationId xmlns:p14="http://schemas.microsoft.com/office/powerpoint/2010/main" val="1352759682"/>
       </p:ext>
     </p:extLst>
   </p:cSld>
@@ -612,7 +788,47 @@
           <a:bodyPr/>
           <a:lstStyle/>
           <a:p>
-            <a:endParaRPr lang="nl-NL" dirty="0"/>
+            <a:r>
+              <a:rPr lang="nl-NL" dirty="0"/>
+              <a:t>Ik heb een tool gemaakt om het voornaamste</a:t>
+            </a:r>
+            <a:r>
+              <a:rPr lang="nl-NL" baseline="0" dirty="0"/>
+              <a:t> onderdeel van gegevensmanagement te monitoren: de gegevenskwaliteit.</a:t>
+            </a:r>
+          </a:p>
+          <a:p>
+            <a:r>
+              <a:rPr lang="nl-NL" baseline="0" dirty="0"/>
+              <a:t>Deze kwaliteit wordt gemeten door de gebruikte informatie te controleren met de originele bron.</a:t>
+            </a:r>
+          </a:p>
+          <a:p>
+            <a:r>
+              <a:rPr lang="nl-NL" baseline="0" dirty="0"/>
+              <a:t>Dagelijks worden er metingen gedaan op de kwaliteit en deze output wordt opgeslagen in de systemen.</a:t>
+            </a:r>
+          </a:p>
+          <a:p>
+            <a:r>
+              <a:rPr lang="nl-NL" baseline="0" dirty="0"/>
+              <a:t>Per maand rapporteren we de trend van de kwaliteit, de historie over een halfjaar naar de betrokken teams en geven hier advies over.</a:t>
+            </a:r>
+          </a:p>
+          <a:p>
+            <a:r>
+              <a:rPr lang="nl-NL" baseline="0" dirty="0"/>
+              <a:t>De vergelijkingen en de tool werken stabiel en goed en produceren net als de ispiegel inzicht in de kwaliteit.</a:t>
+            </a:r>
+          </a:p>
+          <a:p>
+            <a:endParaRPr lang="nl-NL" baseline="0" dirty="0"/>
+          </a:p>
+          <a:p>
+            <a:r>
+              <a:rPr lang="nl-NL" baseline="0" dirty="0"/>
+              <a:t>Graag wil ik onze kwaliteit van de gegevens vergelijken met andere gemeenten, daarvoor ben ik prima bereid om onze vergelijkingen en applicatie te delen.</a:t>
+            </a:r>
           </a:p>
         </p:txBody>
       </p:sp>
@@ -696,6 +912,330 @@
           <a:bodyPr/>
           <a:lstStyle/>
           <a:p>
+            <a:r>
+              <a:rPr lang="en-US" dirty="0"/>
+              <a:t>In</a:t>
+            </a:r>
+            <a:r>
+              <a:rPr lang="en-US" baseline="0" dirty="0"/>
+              <a:t> 2012 is de </a:t>
+            </a:r>
+            <a:r>
+              <a:rPr lang="en-US" baseline="0" dirty="0" err="1"/>
+              <a:t>gemeente</a:t>
+            </a:r>
+            <a:r>
+              <a:rPr lang="en-US" baseline="0" dirty="0"/>
+              <a:t> </a:t>
+            </a:r>
+            <a:r>
+              <a:rPr lang="en-US" baseline="0" dirty="0" err="1"/>
+              <a:t>begonnen</a:t>
+            </a:r>
+            <a:r>
+              <a:rPr lang="en-US" baseline="0" dirty="0"/>
+              <a:t> met het </a:t>
+            </a:r>
+            <a:r>
+              <a:rPr lang="en-US" baseline="0" dirty="0" err="1"/>
+              <a:t>gebruiken</a:t>
+            </a:r>
+            <a:r>
+              <a:rPr lang="en-US" baseline="0" dirty="0"/>
+              <a:t> van de </a:t>
+            </a:r>
+            <a:r>
+              <a:rPr lang="en-US" baseline="0" dirty="0" err="1"/>
+              <a:t>i-spiegel</a:t>
+            </a:r>
+            <a:r>
+              <a:rPr lang="en-US" baseline="0" dirty="0"/>
+              <a:t> </a:t>
+            </a:r>
+            <a:r>
+              <a:rPr lang="en-US" baseline="0" dirty="0" err="1"/>
+              <a:t>applicatie</a:t>
+            </a:r>
+            <a:r>
+              <a:rPr lang="en-US" baseline="0" dirty="0"/>
+              <a:t> van KING.</a:t>
+            </a:r>
+          </a:p>
+          <a:p>
+            <a:r>
+              <a:rPr lang="en-US" baseline="0" dirty="0"/>
+              <a:t>We </a:t>
+            </a:r>
+            <a:r>
+              <a:rPr lang="en-US" baseline="0" dirty="0" err="1"/>
+              <a:t>konden</a:t>
+            </a:r>
+            <a:r>
+              <a:rPr lang="en-US" baseline="0" dirty="0"/>
+              <a:t> </a:t>
+            </a:r>
+            <a:r>
+              <a:rPr lang="en-US" baseline="0" dirty="0" err="1"/>
+              <a:t>hierdoor</a:t>
+            </a:r>
+            <a:r>
+              <a:rPr lang="en-US" baseline="0" dirty="0"/>
+              <a:t> de </a:t>
+            </a:r>
+            <a:r>
+              <a:rPr lang="en-US" baseline="0" dirty="0" err="1"/>
+              <a:t>kwaliteit</a:t>
+            </a:r>
+            <a:r>
+              <a:rPr lang="en-US" baseline="0" dirty="0"/>
+              <a:t> van </a:t>
+            </a:r>
+            <a:r>
+              <a:rPr lang="en-US" baseline="0" dirty="0" err="1"/>
+              <a:t>onze</a:t>
+            </a:r>
+            <a:r>
+              <a:rPr lang="en-US" baseline="0" dirty="0"/>
+              <a:t> </a:t>
+            </a:r>
+            <a:r>
+              <a:rPr lang="en-US" baseline="0" dirty="0" err="1"/>
+              <a:t>gegevens</a:t>
+            </a:r>
+            <a:r>
+              <a:rPr lang="en-US" baseline="0" dirty="0"/>
+              <a:t> </a:t>
+            </a:r>
+            <a:r>
+              <a:rPr lang="en-US" baseline="0" dirty="0" err="1"/>
+              <a:t>meten</a:t>
+            </a:r>
+            <a:r>
+              <a:rPr lang="en-US" baseline="0" dirty="0"/>
+              <a:t>.</a:t>
+            </a:r>
+          </a:p>
+          <a:p>
+            <a:endParaRPr lang="en-US" baseline="0" dirty="0"/>
+          </a:p>
+          <a:p>
+            <a:r>
+              <a:rPr lang="en-US" baseline="0" dirty="0" err="1"/>
+              <a:t>Dit</a:t>
+            </a:r>
+            <a:r>
+              <a:rPr lang="en-US" baseline="0" dirty="0"/>
+              <a:t> is van </a:t>
+            </a:r>
+            <a:r>
+              <a:rPr lang="en-US" baseline="0" dirty="0" err="1"/>
+              <a:t>belang</a:t>
+            </a:r>
+            <a:r>
+              <a:rPr lang="en-US" baseline="0" dirty="0"/>
+              <a:t> </a:t>
+            </a:r>
+            <a:r>
+              <a:rPr lang="en-US" baseline="0" dirty="0" err="1"/>
+              <a:t>omdat</a:t>
+            </a:r>
+            <a:r>
+              <a:rPr lang="en-US" baseline="0" dirty="0"/>
+              <a:t> we </a:t>
+            </a:r>
+            <a:r>
+              <a:rPr lang="en-US" baseline="0" dirty="0" err="1"/>
+              <a:t>bijvoorbeeld</a:t>
+            </a:r>
+            <a:r>
+              <a:rPr lang="en-US" baseline="0" dirty="0"/>
+              <a:t> </a:t>
+            </a:r>
+            <a:r>
+              <a:rPr lang="en-US" baseline="0" dirty="0" err="1"/>
+              <a:t>geen</a:t>
+            </a:r>
+            <a:r>
+              <a:rPr lang="en-US" baseline="0" dirty="0"/>
+              <a:t> </a:t>
+            </a:r>
+            <a:r>
+              <a:rPr lang="en-US" baseline="0" dirty="0" err="1"/>
+              <a:t>brieven</a:t>
+            </a:r>
+            <a:r>
+              <a:rPr lang="en-US" baseline="0" dirty="0"/>
+              <a:t> </a:t>
+            </a:r>
+            <a:r>
+              <a:rPr lang="en-US" baseline="0" dirty="0" err="1"/>
+              <a:t>willen</a:t>
+            </a:r>
+            <a:r>
+              <a:rPr lang="en-US" baseline="0" dirty="0"/>
+              <a:t> </a:t>
+            </a:r>
+            <a:r>
+              <a:rPr lang="en-US" baseline="0" dirty="0" err="1"/>
+              <a:t>versturen</a:t>
+            </a:r>
+            <a:r>
+              <a:rPr lang="en-US" baseline="0" dirty="0"/>
+              <a:t> </a:t>
+            </a:r>
+            <a:r>
+              <a:rPr lang="en-US" baseline="0" dirty="0" err="1"/>
+              <a:t>naar</a:t>
+            </a:r>
+            <a:r>
+              <a:rPr lang="en-US" baseline="0" dirty="0"/>
+              <a:t> overladen </a:t>
+            </a:r>
+            <a:r>
+              <a:rPr lang="en-US" baseline="0" dirty="0" err="1"/>
+              <a:t>personen</a:t>
+            </a:r>
+            <a:r>
+              <a:rPr lang="en-US" baseline="0" dirty="0"/>
+              <a:t> </a:t>
+            </a:r>
+          </a:p>
+          <a:p>
+            <a:r>
+              <a:rPr lang="en-US" baseline="0" dirty="0"/>
+              <a:t>OF </a:t>
+            </a:r>
+            <a:r>
+              <a:rPr lang="en-US" baseline="0" dirty="0" err="1"/>
+              <a:t>wanneer</a:t>
+            </a:r>
+            <a:r>
+              <a:rPr lang="en-US" baseline="0" dirty="0"/>
+              <a:t> </a:t>
+            </a:r>
+            <a:r>
+              <a:rPr lang="en-US" baseline="0" dirty="0" err="1"/>
+              <a:t>een</a:t>
+            </a:r>
+            <a:r>
+              <a:rPr lang="en-US" baseline="0" dirty="0"/>
+              <a:t> burger </a:t>
+            </a:r>
+            <a:r>
+              <a:rPr lang="en-US" baseline="0" dirty="0" err="1"/>
+              <a:t>zich</a:t>
+            </a:r>
+            <a:r>
+              <a:rPr lang="en-US" baseline="0" dirty="0"/>
+              <a:t> </a:t>
+            </a:r>
+            <a:r>
+              <a:rPr lang="en-US" baseline="0" dirty="0" err="1"/>
+              <a:t>bij</a:t>
+            </a:r>
+            <a:r>
+              <a:rPr lang="en-US" baseline="0" dirty="0"/>
+              <a:t> </a:t>
+            </a:r>
+            <a:r>
+              <a:rPr lang="en-US" baseline="0" dirty="0" err="1"/>
+              <a:t>burgerzakenwil</a:t>
+            </a:r>
+            <a:r>
+              <a:rPr lang="en-US" baseline="0" dirty="0"/>
+              <a:t> </a:t>
+            </a:r>
+            <a:r>
+              <a:rPr lang="en-US" baseline="0" dirty="0" err="1"/>
+              <a:t>inschrijven</a:t>
+            </a:r>
+            <a:r>
+              <a:rPr lang="en-US" baseline="0" dirty="0"/>
+              <a:t> op </a:t>
+            </a:r>
+            <a:r>
+              <a:rPr lang="en-US" baseline="0" dirty="0" err="1"/>
+              <a:t>een</a:t>
+            </a:r>
+            <a:r>
+              <a:rPr lang="en-US" baseline="0" dirty="0"/>
+              <a:t> </a:t>
+            </a:r>
+            <a:r>
+              <a:rPr lang="en-US" baseline="0" dirty="0" err="1"/>
+              <a:t>adres</a:t>
+            </a:r>
+            <a:r>
+              <a:rPr lang="en-US" baseline="0" dirty="0"/>
+              <a:t>, </a:t>
+            </a:r>
+            <a:r>
+              <a:rPr lang="en-US" baseline="0" dirty="0" err="1"/>
+              <a:t>deze</a:t>
+            </a:r>
+            <a:r>
+              <a:rPr lang="en-US" baseline="0" dirty="0"/>
+              <a:t> </a:t>
+            </a:r>
+            <a:r>
+              <a:rPr lang="en-US" baseline="0" dirty="0" err="1"/>
+              <a:t>bestaat</a:t>
+            </a:r>
+            <a:r>
+              <a:rPr lang="en-US" baseline="0" dirty="0"/>
+              <a:t>.</a:t>
+            </a:r>
+          </a:p>
+          <a:p>
+            <a:endParaRPr lang="en-US" baseline="0" dirty="0"/>
+          </a:p>
+          <a:p>
+            <a:r>
+              <a:rPr lang="en-US" baseline="0" dirty="0"/>
+              <a:t>Wat we </a:t>
+            </a:r>
+            <a:r>
+              <a:rPr lang="en-US" baseline="0" dirty="0" err="1"/>
+              <a:t>hier</a:t>
+            </a:r>
+            <a:r>
+              <a:rPr lang="en-US" baseline="0" dirty="0"/>
+              <a:t> </a:t>
+            </a:r>
+            <a:r>
+              <a:rPr lang="en-US" baseline="0" dirty="0" err="1"/>
+              <a:t>zien</a:t>
+            </a:r>
+            <a:r>
+              <a:rPr lang="en-US" baseline="0" dirty="0"/>
+              <a:t> is </a:t>
+            </a:r>
+            <a:r>
+              <a:rPr lang="en-US" baseline="0" dirty="0" err="1"/>
+              <a:t>een</a:t>
+            </a:r>
+            <a:r>
+              <a:rPr lang="en-US" baseline="0" dirty="0"/>
+              <a:t> </a:t>
+            </a:r>
+            <a:r>
+              <a:rPr lang="en-US" baseline="0" dirty="0" err="1"/>
+              <a:t>maandrapportage</a:t>
+            </a:r>
+            <a:r>
+              <a:rPr lang="en-US" baseline="0" dirty="0"/>
+              <a:t> </a:t>
+            </a:r>
+            <a:r>
+              <a:rPr lang="en-US" baseline="0" dirty="0" err="1"/>
+              <a:t>uit</a:t>
+            </a:r>
+            <a:r>
+              <a:rPr lang="en-US" baseline="0" dirty="0"/>
+              <a:t> 2013</a:t>
+            </a:r>
+          </a:p>
+          <a:p>
             <a:endParaRPr lang="en-US" dirty="0"/>
           </a:p>
         </p:txBody>
@@ -780,6 +1320,90 @@
           <a:bodyPr/>
           <a:lstStyle/>
           <a:p>
+            <a:r>
+              <a:rPr lang="en-US" dirty="0" err="1"/>
+              <a:t>Een</a:t>
+            </a:r>
+            <a:r>
+              <a:rPr lang="en-US" dirty="0"/>
+              <a:t> </a:t>
+            </a:r>
+            <a:r>
+              <a:rPr lang="en-US" dirty="0" err="1"/>
+              <a:t>belangrijk</a:t>
+            </a:r>
+            <a:r>
+              <a:rPr lang="en-US" dirty="0"/>
+              <a:t> </a:t>
+            </a:r>
+            <a:r>
+              <a:rPr lang="en-US" dirty="0" err="1"/>
+              <a:t>onderdeel</a:t>
+            </a:r>
+            <a:r>
+              <a:rPr lang="en-US" dirty="0"/>
+              <a:t> van </a:t>
+            </a:r>
+            <a:r>
+              <a:rPr lang="en-US" dirty="0" err="1"/>
+              <a:t>deze</a:t>
+            </a:r>
+            <a:r>
+              <a:rPr lang="en-US" dirty="0"/>
+              <a:t> </a:t>
+            </a:r>
+            <a:r>
+              <a:rPr lang="en-US" dirty="0" err="1"/>
+              <a:t>maandelijke</a:t>
+            </a:r>
+            <a:r>
+              <a:rPr lang="en-US" dirty="0"/>
+              <a:t> rapportage is</a:t>
+            </a:r>
+            <a:r>
+              <a:rPr lang="en-US" baseline="0" dirty="0"/>
+              <a:t> de trend, </a:t>
+            </a:r>
+            <a:r>
+              <a:rPr lang="en-US" baseline="0" dirty="0" err="1"/>
+              <a:t>hierdoor</a:t>
+            </a:r>
+            <a:r>
+              <a:rPr lang="en-US" baseline="0" dirty="0"/>
+              <a:t> </a:t>
+            </a:r>
+            <a:r>
+              <a:rPr lang="en-US" baseline="0" dirty="0" err="1"/>
+              <a:t>weten</a:t>
+            </a:r>
+            <a:r>
+              <a:rPr lang="en-US" baseline="0" dirty="0"/>
+              <a:t> we of de </a:t>
+            </a:r>
+            <a:r>
+              <a:rPr lang="en-US" baseline="0" dirty="0" err="1"/>
+              <a:t>kwaliteit</a:t>
+            </a:r>
+            <a:r>
+              <a:rPr lang="en-US" baseline="0" dirty="0"/>
+              <a:t> </a:t>
+            </a:r>
+            <a:r>
+              <a:rPr lang="en-US" baseline="0" dirty="0" err="1"/>
+              <a:t>verbeterd</a:t>
+            </a:r>
+            <a:r>
+              <a:rPr lang="en-US" baseline="0" dirty="0"/>
+              <a:t> of </a:t>
+            </a:r>
+            <a:r>
+              <a:rPr lang="en-US" baseline="0" dirty="0" err="1"/>
+              <a:t>verslechterd</a:t>
+            </a:r>
+            <a:r>
+              <a:rPr lang="en-US" baseline="0" dirty="0"/>
+              <a:t>.</a:t>
+            </a:r>
             <a:endParaRPr lang="en-US" dirty="0"/>
           </a:p>
         </p:txBody>
@@ -801,7 +1425,7 @@
           <a:p>
             <a:fld id="{BD72EC12-EE16-490E-9213-0A8A2517DDEC}" type="slidenum">
               <a:rPr lang="nl-NL" smtClean="0"/>
-              <a:t>5</a:t>
+              <a:t>4</a:t>
             </a:fld>
             <a:endParaRPr lang="nl-NL"/>
           </a:p>
@@ -864,6 +1488,425 @@
           <a:bodyPr/>
           <a:lstStyle/>
           <a:p>
+            <a:r>
+              <a:rPr lang="en-US" dirty="0" err="1"/>
+              <a:t>Een</a:t>
+            </a:r>
+            <a:r>
+              <a:rPr lang="en-US" dirty="0"/>
+              <a:t> </a:t>
+            </a:r>
+            <a:r>
+              <a:rPr lang="en-US" dirty="0" err="1"/>
+              <a:t>andere</a:t>
+            </a:r>
+            <a:r>
+              <a:rPr lang="en-US" dirty="0"/>
+              <a:t> </a:t>
+            </a:r>
+            <a:r>
+              <a:rPr lang="en-US" dirty="0" err="1"/>
+              <a:t>belangijke</a:t>
+            </a:r>
+            <a:r>
+              <a:rPr lang="en-US" dirty="0"/>
+              <a:t> </a:t>
+            </a:r>
+            <a:r>
+              <a:rPr lang="en-US" dirty="0" err="1"/>
+              <a:t>vergelijking</a:t>
+            </a:r>
+            <a:r>
+              <a:rPr lang="en-US" dirty="0"/>
+              <a:t> is de </a:t>
+            </a:r>
+            <a:r>
+              <a:rPr lang="en-US" dirty="0" err="1"/>
+              <a:t>vergelijking</a:t>
+            </a:r>
+            <a:r>
+              <a:rPr lang="en-US" dirty="0"/>
+              <a:t> met de </a:t>
+            </a:r>
+            <a:r>
+              <a:rPr lang="en-US" baseline="0" dirty="0" err="1"/>
+              <a:t>andere</a:t>
+            </a:r>
+            <a:r>
+              <a:rPr lang="en-US" baseline="0" dirty="0"/>
+              <a:t> </a:t>
+            </a:r>
+            <a:r>
+              <a:rPr lang="en-US" baseline="0" dirty="0" err="1"/>
+              <a:t>gemeenten</a:t>
+            </a:r>
+            <a:r>
+              <a:rPr lang="en-US" baseline="0" dirty="0"/>
+              <a:t>.</a:t>
+            </a:r>
+          </a:p>
+          <a:p>
+            <a:r>
+              <a:rPr lang="en-US" baseline="0" dirty="0" err="1"/>
+              <a:t>Wij</a:t>
+            </a:r>
+            <a:r>
+              <a:rPr lang="en-US" baseline="0" dirty="0"/>
+              <a:t> </a:t>
+            </a:r>
+            <a:r>
+              <a:rPr lang="en-US" baseline="0" dirty="0" err="1"/>
+              <a:t>vinden</a:t>
+            </a:r>
+            <a:r>
+              <a:rPr lang="en-US" baseline="0" dirty="0"/>
+              <a:t> het lasting om </a:t>
+            </a:r>
+            <a:r>
+              <a:rPr lang="en-US" baseline="0" dirty="0" err="1"/>
+              <a:t>te</a:t>
+            </a:r>
+            <a:r>
+              <a:rPr lang="en-US" baseline="0" dirty="0"/>
+              <a:t> </a:t>
+            </a:r>
+            <a:r>
+              <a:rPr lang="en-US" baseline="0" dirty="0" err="1"/>
+              <a:t>weten</a:t>
+            </a:r>
+            <a:r>
+              <a:rPr lang="en-US" baseline="0" dirty="0"/>
+              <a:t> wat </a:t>
+            </a:r>
+            <a:r>
+              <a:rPr lang="en-US" baseline="0" dirty="0" err="1"/>
+              <a:t>een</a:t>
+            </a:r>
+            <a:r>
+              <a:rPr lang="en-US" baseline="0" dirty="0"/>
+              <a:t> </a:t>
+            </a:r>
+            <a:r>
+              <a:rPr lang="en-US" baseline="0" dirty="0" err="1"/>
+              <a:t>goede</a:t>
+            </a:r>
+            <a:r>
+              <a:rPr lang="en-US" baseline="0" dirty="0"/>
+              <a:t> </a:t>
+            </a:r>
+            <a:r>
+              <a:rPr lang="en-US" baseline="0" dirty="0" err="1"/>
+              <a:t>waarde</a:t>
+            </a:r>
+            <a:r>
+              <a:rPr lang="en-US" baseline="0" dirty="0"/>
+              <a:t> is van de </a:t>
+            </a:r>
+            <a:r>
+              <a:rPr lang="en-US" baseline="0" dirty="0" err="1"/>
+              <a:t>kwaliteit</a:t>
+            </a:r>
+            <a:r>
+              <a:rPr lang="en-US" baseline="0" dirty="0"/>
+              <a:t>.</a:t>
+            </a:r>
+          </a:p>
+        </p:txBody>
+      </p:sp>
+      <p:sp>
+        <p:nvSpPr>
+          <p:cNvPr id="4" name="Tijdelijke aanduiding voor dianummer 3"/>
+          <p:cNvSpPr>
+            <a:spLocks noGrp="1"/>
+          </p:cNvSpPr>
+          <p:nvPr>
+            <p:ph type="sldNum" sz="quarter" idx="10"/>
+          </p:nvPr>
+        </p:nvSpPr>
+        <p:spPr/>
+        <p:txBody>
+          <a:bodyPr/>
+          <a:lstStyle/>
+          <a:p>
+            <a:fld id="{BD72EC12-EE16-490E-9213-0A8A2517DDEC}" type="slidenum">
+              <a:rPr lang="nl-NL" smtClean="0"/>
+              <a:t>5</a:t>
+            </a:fld>
+            <a:endParaRPr lang="nl-NL"/>
+          </a:p>
+        </p:txBody>
+      </p:sp>
+    </p:spTree>
+    <p:extLst>
+      <p:ext uri="{BB962C8B-B14F-4D97-AF65-F5344CB8AC3E}">
+        <p14:creationId xmlns:p14="http://schemas.microsoft.com/office/powerpoint/2010/main" val="2369633044"/>
+      </p:ext>
+    </p:extLst>
+  </p:cSld>
+  <p:clrMapOvr>
+    <a:masterClrMapping/>
+  </p:clrMapOvr>
+</p:notes>
+</file>
+
+<file path=ppt/notesSlides/notesSlide6.xml><?xml version="1.0" encoding="utf-8"?>
+<p:notes xmlns:a="http://schemas.openxmlformats.org/drawingml/2006/main" xmlns:r="http://schemas.openxmlformats.org/officeDocument/2006/relationships" xmlns:p="http://schemas.openxmlformats.org/presentationml/2006/main">
+  <p:cSld>
+    <p:spTree>
+      <p:nvGrpSpPr>
+        <p:cNvPr id="1" name=""/>
+        <p:cNvGrpSpPr/>
+        <p:nvPr/>
+      </p:nvGrpSpPr>
+      <p:grpSpPr>
+        <a:xfrm>
+          <a:off x="0" y="0"/>
+          <a:ext cx="0" cy="0"/>
+          <a:chOff x="0" y="0"/>
+          <a:chExt cx="0" cy="0"/>
+        </a:xfrm>
+      </p:grpSpPr>
+      <p:sp>
+        <p:nvSpPr>
+          <p:cNvPr id="2" name="Tijdelijke aanduiding voor dia-afbeelding 1"/>
+          <p:cNvSpPr>
+            <a:spLocks noGrp="1" noRot="1" noChangeAspect="1"/>
+          </p:cNvSpPr>
+          <p:nvPr>
+            <p:ph type="sldImg"/>
+          </p:nvPr>
+        </p:nvSpPr>
+        <p:spPr/>
+      </p:sp>
+      <p:sp>
+        <p:nvSpPr>
+          <p:cNvPr id="3" name="Tijdelijke aanduiding voor notities 2"/>
+          <p:cNvSpPr>
+            <a:spLocks noGrp="1"/>
+          </p:cNvSpPr>
+          <p:nvPr>
+            <p:ph type="body" idx="1"/>
+          </p:nvPr>
+        </p:nvSpPr>
+        <p:spPr/>
+        <p:txBody>
+          <a:bodyPr/>
+          <a:lstStyle/>
+          <a:p>
+            <a:r>
+              <a:rPr lang="nl-NL" noProof="0" dirty="0"/>
+              <a:t>We gebruiken deze informatie om bij een dalende</a:t>
+            </a:r>
+            <a:r>
+              <a:rPr lang="nl-NL" baseline="0" noProof="0" dirty="0"/>
+              <a:t> kwaliteit de dialoog op te starten met de betreffende gegevensgebruiker.</a:t>
+            </a:r>
+          </a:p>
+          <a:p>
+            <a:endParaRPr lang="nl-NL" baseline="0" noProof="0" dirty="0"/>
+          </a:p>
+          <a:p>
+            <a:r>
+              <a:rPr lang="nl-NL" baseline="0" noProof="0" dirty="0"/>
+              <a:t>Wanneer er een daling in de kwaliteit ontstaat, dan is het belangrijk om samen inzicht te krijgen in het proces: op deze manier groeit de kennis over de herkomst en het gebruik van de gegevens.</a:t>
+            </a:r>
+          </a:p>
+          <a:p>
+            <a:endParaRPr lang="nl-NL" baseline="0" noProof="0" dirty="0"/>
+          </a:p>
+          <a:p>
+            <a:r>
+              <a:rPr lang="nl-NL" baseline="0" noProof="0" dirty="0"/>
+              <a:t>Wanneer er iets “fout” gaat, dan voegen we deze toe aan onze controles. </a:t>
+            </a:r>
+          </a:p>
+          <a:p>
+            <a:endParaRPr lang="nl-NL" baseline="0" noProof="0" dirty="0"/>
+          </a:p>
+          <a:p>
+            <a:r>
+              <a:rPr lang="nl-NL" baseline="0" noProof="0" dirty="0"/>
+              <a:t>We kunnen dan onderzoeken wat de nieuwe afwijkingen zijn en de oorzaak hiervan herstellen.</a:t>
+            </a:r>
+          </a:p>
+        </p:txBody>
+      </p:sp>
+      <p:sp>
+        <p:nvSpPr>
+          <p:cNvPr id="4" name="Tijdelijke aanduiding voor dianummer 3"/>
+          <p:cNvSpPr>
+            <a:spLocks noGrp="1"/>
+          </p:cNvSpPr>
+          <p:nvPr>
+            <p:ph type="sldNum" sz="quarter" idx="10"/>
+          </p:nvPr>
+        </p:nvSpPr>
+        <p:spPr/>
+        <p:txBody>
+          <a:bodyPr/>
+          <a:lstStyle/>
+          <a:p>
+            <a:fld id="{BD72EC12-EE16-490E-9213-0A8A2517DDEC}" type="slidenum">
+              <a:rPr lang="nl-NL" smtClean="0"/>
+              <a:t>6</a:t>
+            </a:fld>
+            <a:endParaRPr lang="nl-NL"/>
+          </a:p>
+        </p:txBody>
+      </p:sp>
+    </p:spTree>
+    <p:extLst>
+      <p:ext uri="{BB962C8B-B14F-4D97-AF65-F5344CB8AC3E}">
+        <p14:creationId xmlns:p14="http://schemas.microsoft.com/office/powerpoint/2010/main" val="2300544380"/>
+      </p:ext>
+    </p:extLst>
+  </p:cSld>
+  <p:clrMapOvr>
+    <a:masterClrMapping/>
+  </p:clrMapOvr>
+</p:notes>
+</file>
+
+<file path=ppt/notesSlides/notesSlide7.xml><?xml version="1.0" encoding="utf-8"?>
+<p:notes xmlns:a="http://schemas.openxmlformats.org/drawingml/2006/main" xmlns:r="http://schemas.openxmlformats.org/officeDocument/2006/relationships" xmlns:p="http://schemas.openxmlformats.org/presentationml/2006/main">
+  <p:cSld>
+    <p:spTree>
+      <p:nvGrpSpPr>
+        <p:cNvPr id="1" name=""/>
+        <p:cNvGrpSpPr/>
+        <p:nvPr/>
+      </p:nvGrpSpPr>
+      <p:grpSpPr>
+        <a:xfrm>
+          <a:off x="0" y="0"/>
+          <a:ext cx="0" cy="0"/>
+          <a:chOff x="0" y="0"/>
+          <a:chExt cx="0" cy="0"/>
+        </a:xfrm>
+      </p:grpSpPr>
+      <p:sp>
+        <p:nvSpPr>
+          <p:cNvPr id="2" name="Tijdelijke aanduiding voor dia-afbeelding 1"/>
+          <p:cNvSpPr>
+            <a:spLocks noGrp="1" noRot="1" noChangeAspect="1"/>
+          </p:cNvSpPr>
+          <p:nvPr>
+            <p:ph type="sldImg"/>
+          </p:nvPr>
+        </p:nvSpPr>
+        <p:spPr/>
+      </p:sp>
+      <p:sp>
+        <p:nvSpPr>
+          <p:cNvPr id="3" name="Tijdelijke aanduiding voor notities 2"/>
+          <p:cNvSpPr>
+            <a:spLocks noGrp="1"/>
+          </p:cNvSpPr>
+          <p:nvPr>
+            <p:ph type="body" idx="1"/>
+          </p:nvPr>
+        </p:nvSpPr>
+        <p:spPr/>
+        <p:txBody>
+          <a:bodyPr/>
+          <a:lstStyle/>
+          <a:p>
+            <a:r>
+              <a:rPr lang="en-US" dirty="0" err="1"/>
+              <a:t>Tegenwoordig</a:t>
+            </a:r>
+            <a:r>
+              <a:rPr lang="en-US" baseline="0" dirty="0"/>
+              <a:t> is het </a:t>
+            </a:r>
+            <a:r>
+              <a:rPr lang="en-US" baseline="0" dirty="0" err="1"/>
+              <a:t>aantal</a:t>
+            </a:r>
+            <a:r>
+              <a:rPr lang="en-US" baseline="0" dirty="0"/>
+              <a:t> </a:t>
+            </a:r>
+            <a:r>
+              <a:rPr lang="en-US" baseline="0" dirty="0" err="1"/>
+              <a:t>vergelijkingen</a:t>
+            </a:r>
+            <a:r>
+              <a:rPr lang="en-US" baseline="0" dirty="0"/>
+              <a:t> </a:t>
+            </a:r>
+            <a:r>
+              <a:rPr lang="en-US" baseline="0" dirty="0" err="1"/>
+              <a:t>toegenomen</a:t>
+            </a:r>
+            <a:r>
+              <a:rPr lang="en-US" baseline="0" dirty="0"/>
+              <a:t> </a:t>
+            </a:r>
+            <a:r>
+              <a:rPr lang="en-US" baseline="0" dirty="0" err="1"/>
+              <a:t>en</a:t>
+            </a:r>
+            <a:r>
+              <a:rPr lang="en-US" baseline="0" dirty="0"/>
+              <a:t> </a:t>
+            </a:r>
+            <a:r>
+              <a:rPr lang="en-US" baseline="0" dirty="0" err="1"/>
+              <a:t>zijn</a:t>
+            </a:r>
+            <a:r>
+              <a:rPr lang="en-US" baseline="0" dirty="0"/>
+              <a:t> </a:t>
+            </a:r>
+            <a:r>
+              <a:rPr lang="en-US" baseline="0" dirty="0" err="1"/>
+              <a:t>lang</a:t>
+            </a:r>
+            <a:r>
+              <a:rPr lang="en-US" baseline="0" dirty="0"/>
+              <a:t> </a:t>
+            </a:r>
+            <a:r>
+              <a:rPr lang="en-US" baseline="0" dirty="0" err="1"/>
+              <a:t>niet</a:t>
+            </a:r>
+            <a:r>
+              <a:rPr lang="en-US" baseline="0" dirty="0"/>
+              <a:t> </a:t>
+            </a:r>
+            <a:r>
+              <a:rPr lang="en-US" baseline="0" dirty="0" err="1"/>
+              <a:t>alle</a:t>
+            </a:r>
+            <a:r>
+              <a:rPr lang="en-US" baseline="0" dirty="0"/>
+              <a:t> </a:t>
+            </a:r>
+            <a:r>
+              <a:rPr lang="en-US" baseline="0" dirty="0" err="1"/>
+              <a:t>vergelijkingen</a:t>
+            </a:r>
+            <a:r>
+              <a:rPr lang="en-US" baseline="0" dirty="0"/>
+              <a:t> </a:t>
+            </a:r>
+            <a:r>
+              <a:rPr lang="en-US" baseline="0" dirty="0" err="1"/>
+              <a:t>zichtbaar</a:t>
+            </a:r>
+            <a:r>
+              <a:rPr lang="en-US" baseline="0" dirty="0"/>
+              <a:t> in de </a:t>
+            </a:r>
+            <a:r>
+              <a:rPr lang="en-US" baseline="0" dirty="0" err="1"/>
+              <a:t>maandrapportage</a:t>
+            </a:r>
+            <a:r>
+              <a:rPr lang="en-US" baseline="0" dirty="0"/>
+              <a:t>.</a:t>
+            </a:r>
             <a:endParaRPr lang="en-US" dirty="0"/>
           </a:p>
         </p:txBody>
@@ -895,6 +1938,337 @@
     <p:extLst>
       <p:ext uri="{BB962C8B-B14F-4D97-AF65-F5344CB8AC3E}">
         <p14:creationId xmlns:p14="http://schemas.microsoft.com/office/powerpoint/2010/main" val="2023848630"/>
+      </p:ext>
+    </p:extLst>
+  </p:cSld>
+  <p:clrMapOvr>
+    <a:masterClrMapping/>
+  </p:clrMapOvr>
+</p:notes>
+</file>
+
+<file path=ppt/notesSlides/notesSlide8.xml><?xml version="1.0" encoding="utf-8"?>
+<p:notes xmlns:a="http://schemas.openxmlformats.org/drawingml/2006/main" xmlns:r="http://schemas.openxmlformats.org/officeDocument/2006/relationships" xmlns:p="http://schemas.openxmlformats.org/presentationml/2006/main">
+  <p:cSld>
+    <p:spTree>
+      <p:nvGrpSpPr>
+        <p:cNvPr id="1" name=""/>
+        <p:cNvGrpSpPr/>
+        <p:nvPr/>
+      </p:nvGrpSpPr>
+      <p:grpSpPr>
+        <a:xfrm>
+          <a:off x="0" y="0"/>
+          <a:ext cx="0" cy="0"/>
+          <a:chOff x="0" y="0"/>
+          <a:chExt cx="0" cy="0"/>
+        </a:xfrm>
+      </p:grpSpPr>
+      <p:sp>
+        <p:nvSpPr>
+          <p:cNvPr id="2" name="Tijdelijke aanduiding voor dia-afbeelding 1"/>
+          <p:cNvSpPr>
+            <a:spLocks noGrp="1" noRot="1" noChangeAspect="1"/>
+          </p:cNvSpPr>
+          <p:nvPr>
+            <p:ph type="sldImg"/>
+          </p:nvPr>
+        </p:nvSpPr>
+        <p:spPr/>
+      </p:sp>
+      <p:sp>
+        <p:nvSpPr>
+          <p:cNvPr id="3" name="Tijdelijke aanduiding voor notities 2"/>
+          <p:cNvSpPr>
+            <a:spLocks noGrp="1"/>
+          </p:cNvSpPr>
+          <p:nvPr>
+            <p:ph type="body" idx="1"/>
+          </p:nvPr>
+        </p:nvSpPr>
+        <p:spPr/>
+        <p:txBody>
+          <a:bodyPr/>
+          <a:lstStyle/>
+          <a:p>
+            <a:r>
+              <a:rPr lang="nl-NL" dirty="0"/>
+              <a:t>Naast de maandelijkse rapportage kunnen we ook over</a:t>
+            </a:r>
+            <a:r>
+              <a:rPr lang="nl-NL" baseline="0" dirty="0"/>
+              <a:t> onze gegevens rapporteren vanuit </a:t>
+            </a:r>
+            <a:r>
+              <a:rPr lang="nl-NL" baseline="0" dirty="0" err="1"/>
+              <a:t>Cognos</a:t>
+            </a:r>
+            <a:r>
+              <a:rPr lang="nl-NL" baseline="0" dirty="0"/>
+              <a:t> en </a:t>
+            </a:r>
+            <a:r>
+              <a:rPr lang="nl-NL" baseline="0" dirty="0" err="1"/>
+              <a:t>QlikSense</a:t>
+            </a:r>
+            <a:r>
+              <a:rPr lang="nl-NL" baseline="0" dirty="0"/>
+              <a:t>.</a:t>
+            </a:r>
+          </a:p>
+          <a:p>
+            <a:endParaRPr lang="nl-NL" baseline="0" dirty="0"/>
+          </a:p>
+          <a:p>
+            <a:r>
+              <a:rPr lang="nl-NL" baseline="0" dirty="0"/>
+              <a:t>Het voorbeeld hier gaat:</a:t>
+            </a:r>
+          </a:p>
+          <a:p>
+            <a:pPr marL="171450" indent="-171450">
+              <a:buFontTx/>
+              <a:buChar char="-"/>
+            </a:pPr>
+            <a:r>
+              <a:rPr lang="nl-NL" baseline="0" dirty="0"/>
+              <a:t>Als eerste over de kwaliteit van de gebruikte BAG-adressen bij burgerzaken</a:t>
+            </a:r>
+          </a:p>
+          <a:p>
+            <a:pPr marL="171450" indent="-171450">
+              <a:buFontTx/>
+              <a:buChar char="-"/>
+            </a:pPr>
+            <a:r>
+              <a:rPr lang="nl-NL" baseline="0" dirty="0"/>
+              <a:t>Als tweede de voortgang voor de aansluiting bij de BAG-WOZ koppeling</a:t>
+            </a:r>
+          </a:p>
+          <a:p>
+            <a:pPr marL="171450" indent="-171450">
+              <a:buFontTx/>
+              <a:buChar char="-"/>
+            </a:pPr>
+            <a:r>
+              <a:rPr lang="nl-NL" baseline="0" dirty="0"/>
+              <a:t>Daarnaast kun je natuurlijk ook nog kijken wat de kwaliteit van de burgers is in de WOZ administratie</a:t>
+            </a:r>
+          </a:p>
+          <a:p>
+            <a:endParaRPr lang="nl-NL" dirty="0"/>
+          </a:p>
+        </p:txBody>
+      </p:sp>
+      <p:sp>
+        <p:nvSpPr>
+          <p:cNvPr id="4" name="Tijdelijke aanduiding voor dianummer 3"/>
+          <p:cNvSpPr>
+            <a:spLocks noGrp="1"/>
+          </p:cNvSpPr>
+          <p:nvPr>
+            <p:ph type="sldNum" sz="quarter" idx="10"/>
+          </p:nvPr>
+        </p:nvSpPr>
+        <p:spPr/>
+        <p:txBody>
+          <a:bodyPr/>
+          <a:lstStyle/>
+          <a:p>
+            <a:fld id="{BD72EC12-EE16-490E-9213-0A8A2517DDEC}" type="slidenum">
+              <a:rPr lang="nl-NL" smtClean="0"/>
+              <a:t>8</a:t>
+            </a:fld>
+            <a:endParaRPr lang="nl-NL"/>
+          </a:p>
+        </p:txBody>
+      </p:sp>
+    </p:spTree>
+    <p:extLst>
+      <p:ext uri="{BB962C8B-B14F-4D97-AF65-F5344CB8AC3E}">
+        <p14:creationId xmlns:p14="http://schemas.microsoft.com/office/powerpoint/2010/main" val="1074422441"/>
+      </p:ext>
+    </p:extLst>
+  </p:cSld>
+  <p:clrMapOvr>
+    <a:masterClrMapping/>
+  </p:clrMapOvr>
+</p:notes>
+</file>
+
+<file path=ppt/notesSlides/notesSlide9.xml><?xml version="1.0" encoding="utf-8"?>
+<p:notes xmlns:a="http://schemas.openxmlformats.org/drawingml/2006/main" xmlns:r="http://schemas.openxmlformats.org/officeDocument/2006/relationships" xmlns:p="http://schemas.openxmlformats.org/presentationml/2006/main">
+  <p:cSld>
+    <p:spTree>
+      <p:nvGrpSpPr>
+        <p:cNvPr id="1" name=""/>
+        <p:cNvGrpSpPr/>
+        <p:nvPr/>
+      </p:nvGrpSpPr>
+      <p:grpSpPr>
+        <a:xfrm>
+          <a:off x="0" y="0"/>
+          <a:ext cx="0" cy="0"/>
+          <a:chOff x="0" y="0"/>
+          <a:chExt cx="0" cy="0"/>
+        </a:xfrm>
+      </p:grpSpPr>
+      <p:sp>
+        <p:nvSpPr>
+          <p:cNvPr id="2" name="Tijdelijke aanduiding voor dia-afbeelding 1"/>
+          <p:cNvSpPr>
+            <a:spLocks noGrp="1" noRot="1" noChangeAspect="1"/>
+          </p:cNvSpPr>
+          <p:nvPr>
+            <p:ph type="sldImg"/>
+          </p:nvPr>
+        </p:nvSpPr>
+        <p:spPr/>
+      </p:sp>
+      <p:sp>
+        <p:nvSpPr>
+          <p:cNvPr id="3" name="Tijdelijke aanduiding voor notities 2"/>
+          <p:cNvSpPr>
+            <a:spLocks noGrp="1"/>
+          </p:cNvSpPr>
+          <p:nvPr>
+            <p:ph type="body" idx="1"/>
+          </p:nvPr>
+        </p:nvSpPr>
+        <p:spPr/>
+        <p:txBody>
+          <a:bodyPr/>
+          <a:lstStyle/>
+          <a:p>
+            <a:pPr marL="171450" indent="-171450">
+              <a:buFontTx/>
+              <a:buChar char="-"/>
+            </a:pPr>
+            <a:r>
+              <a:rPr lang="nl-NL" dirty="0"/>
+              <a:t>We hebben dus naast onze bestaande maandelijkse rapportage</a:t>
+            </a:r>
+          </a:p>
+          <a:p>
+            <a:pPr marL="171450" indent="-171450">
+              <a:buFontTx/>
+              <a:buChar char="-"/>
+            </a:pPr>
+            <a:r>
+              <a:rPr lang="nl-NL" dirty="0"/>
+              <a:t>Nieuwe vergelijkingen</a:t>
+            </a:r>
+          </a:p>
+          <a:p>
+            <a:pPr marL="171450" indent="-171450">
+              <a:buFontTx/>
+              <a:buChar char="-"/>
+            </a:pPr>
+            <a:r>
+              <a:rPr lang="nl-NL" dirty="0"/>
+              <a:t>Een</a:t>
+            </a:r>
+            <a:r>
+              <a:rPr lang="nl-NL" baseline="0" dirty="0"/>
+              <a:t> historie, waardoor we over meerdere jaren de trend kunnen volgen</a:t>
+            </a:r>
+          </a:p>
+          <a:p>
+            <a:pPr marL="171450" indent="-171450">
+              <a:buFontTx/>
+              <a:buChar char="-"/>
+            </a:pPr>
+            <a:r>
+              <a:rPr lang="nl-NL" baseline="0" dirty="0"/>
+              <a:t>Ook kunnen we via rapportage </a:t>
+            </a:r>
+            <a:r>
+              <a:rPr lang="nl-NL" baseline="0" dirty="0" err="1"/>
+              <a:t>tooling</a:t>
+            </a:r>
+            <a:r>
+              <a:rPr lang="nl-NL" baseline="0" dirty="0"/>
+              <a:t> onze gegevens in </a:t>
+            </a:r>
+            <a:r>
+              <a:rPr lang="nl-NL" baseline="0" dirty="0" err="1"/>
+              <a:t>Cognos</a:t>
+            </a:r>
+            <a:r>
+              <a:rPr lang="nl-NL" baseline="0" dirty="0"/>
+              <a:t> en </a:t>
+            </a:r>
+            <a:r>
+              <a:rPr lang="nl-NL" baseline="0" dirty="0" err="1"/>
+              <a:t>QlikSense</a:t>
+            </a:r>
+            <a:r>
+              <a:rPr lang="nl-NL" baseline="0" dirty="0"/>
+              <a:t> bekijken</a:t>
+            </a:r>
+          </a:p>
+          <a:p>
+            <a:pPr marL="171450" indent="-171450">
+              <a:buFontTx/>
+              <a:buChar char="-"/>
+            </a:pPr>
+            <a:r>
+              <a:rPr lang="nl-NL" baseline="0" dirty="0"/>
+              <a:t>Dit wordt dagelijks een vergelijking gemaakt en opgeslagen in de database</a:t>
+            </a:r>
+          </a:p>
+          <a:p>
+            <a:pPr marL="171450" indent="-171450">
+              <a:buFontTx/>
+              <a:buChar char="-"/>
+            </a:pPr>
+            <a:r>
+              <a:rPr lang="nl-NL" baseline="0" dirty="0"/>
+              <a:t>Inmiddels koppelen we met Oracle, </a:t>
+            </a:r>
+            <a:r>
+              <a:rPr lang="nl-NL" baseline="0" dirty="0" err="1"/>
+              <a:t>SqlServer</a:t>
+            </a:r>
+            <a:r>
+              <a:rPr lang="nl-NL" baseline="0" dirty="0"/>
+              <a:t> en </a:t>
+            </a:r>
+            <a:r>
+              <a:rPr lang="nl-NL" baseline="0" dirty="0" err="1"/>
+              <a:t>MySql</a:t>
+            </a:r>
+            <a:endParaRPr lang="nl-NL" dirty="0"/>
+          </a:p>
+        </p:txBody>
+      </p:sp>
+      <p:sp>
+        <p:nvSpPr>
+          <p:cNvPr id="4" name="Tijdelijke aanduiding voor dianummer 3"/>
+          <p:cNvSpPr>
+            <a:spLocks noGrp="1"/>
+          </p:cNvSpPr>
+          <p:nvPr>
+            <p:ph type="sldNum" sz="quarter" idx="10"/>
+          </p:nvPr>
+        </p:nvSpPr>
+        <p:spPr/>
+        <p:txBody>
+          <a:bodyPr/>
+          <a:lstStyle/>
+          <a:p>
+            <a:fld id="{BD72EC12-EE16-490E-9213-0A8A2517DDEC}" type="slidenum">
+              <a:rPr lang="nl-NL" smtClean="0"/>
+              <a:t>9</a:t>
+            </a:fld>
+            <a:endParaRPr lang="nl-NL"/>
+          </a:p>
+        </p:txBody>
+      </p:sp>
+    </p:spTree>
+    <p:extLst>
+      <p:ext uri="{BB962C8B-B14F-4D97-AF65-F5344CB8AC3E}">
+        <p14:creationId xmlns:p14="http://schemas.microsoft.com/office/powerpoint/2010/main" val="3706769350"/>
       </p:ext>
     </p:extLst>
   </p:cSld>
@@ -3972,16 +5346,8 @@
               <a:defRPr/>
             </a:pPr>
             <a:r>
-              <a:rPr lang="nl-NL" dirty="0" smtClean="0"/>
-              <a:t>De </a:t>
-            </a:r>
-            <a:r>
               <a:rPr lang="nl-NL" dirty="0"/>
-              <a:t>g</a:t>
-            </a:r>
-            <a:r>
-              <a:rPr lang="nl-NL" dirty="0" smtClean="0"/>
-              <a:t>egevensvergelijker</a:t>
+              <a:t>De gegevensvergelijker</a:t>
             </a:r>
             <a:endParaRPr lang="nl-NL" dirty="0">
               <a:effectLst/>
@@ -4008,17 +5374,13 @@
           <a:p>
             <a:r>
               <a:rPr lang="en-US" dirty="0"/>
-              <a:t>Eduard </a:t>
-            </a:r>
-            <a:r>
-              <a:rPr lang="en-US" dirty="0" smtClean="0"/>
-              <a:t>Witteveen</a:t>
-            </a:r>
-            <a:r>
-              <a:rPr lang="nl-NL" dirty="0" smtClean="0"/>
+              <a:t>Eduard Witteveen</a:t>
+            </a:r>
+            <a:r>
+              <a:rPr lang="nl-NL" dirty="0"/>
               <a:t> - Gegevensbeheerder</a:t>
             </a:r>
-            <a:endParaRPr lang="en-US" sz="3200" kern="1200" dirty="0" smtClean="0">
+            <a:endParaRPr lang="en-US" sz="3200" kern="1200" dirty="0">
               <a:solidFill>
                 <a:schemeClr val="tx1">
                   <a:tint val="75000"/>
@@ -4033,7 +5395,7 @@
           <a:p>
             <a:pPr rtl="0" eaLnBrk="1" latinLnBrk="0" hangingPunct="1"/>
             <a:r>
-              <a:rPr lang="en-US" sz="3200" kern="1200" dirty="0" smtClean="0">
+              <a:rPr lang="en-US" sz="3200" kern="1200" dirty="0">
                 <a:solidFill>
                   <a:schemeClr val="tx1">
                     <a:tint val="75000"/>
@@ -4047,7 +5409,7 @@
               <a:t>Over </a:t>
             </a:r>
             <a:r>
-              <a:rPr lang="en-US" sz="3200" kern="1200" dirty="0" err="1" smtClean="0">
+              <a:rPr lang="en-US" sz="3200" kern="1200" dirty="0" err="1">
                 <a:solidFill>
                   <a:schemeClr val="tx1">
                     <a:tint val="75000"/>
@@ -4061,7 +5423,7 @@
               <a:t>onze</a:t>
             </a:r>
             <a:r>
-              <a:rPr lang="en-US" sz="3200" kern="1200" dirty="0" smtClean="0">
+              <a:rPr lang="en-US" sz="3200" kern="1200" dirty="0">
                 <a:solidFill>
                   <a:schemeClr val="tx1">
                     <a:tint val="75000"/>
@@ -4075,7 +5437,7 @@
               <a:t> </a:t>
             </a:r>
             <a:r>
-              <a:rPr lang="en-US" sz="3200" kern="1200" dirty="0" err="1" smtClean="0">
+              <a:rPr lang="en-US" sz="3200" kern="1200" dirty="0" err="1">
                 <a:solidFill>
                   <a:schemeClr val="tx1">
                     <a:tint val="75000"/>
@@ -4089,7 +5451,7 @@
               <a:t>eigen</a:t>
             </a:r>
             <a:r>
-              <a:rPr lang="en-US" sz="3200" kern="1200" dirty="0" smtClean="0">
+              <a:rPr lang="en-US" sz="3200" kern="1200" dirty="0">
                 <a:solidFill>
                   <a:schemeClr val="tx1">
                     <a:tint val="75000"/>
@@ -4152,11 +5514,7 @@
           <a:p>
             <a:r>
               <a:rPr lang="nl-NL" dirty="0"/>
-              <a:t>Mijn </a:t>
-            </a:r>
-            <a:r>
-              <a:rPr lang="nl-NL" dirty="0" smtClean="0"/>
-              <a:t>wens</a:t>
+              <a:t>Mijn wens</a:t>
             </a:r>
             <a:endParaRPr lang="en-US" dirty="0"/>
           </a:p>
@@ -4185,8 +5543,20 @@
           <a:lstStyle/>
           <a:p>
             <a:r>
-              <a:rPr lang="en-US" dirty="0"/>
-              <a:t>Benchmarking met </a:t>
+              <a:rPr lang="en-US" dirty="0" err="1"/>
+              <a:t>Kwaliteit</a:t>
+            </a:r>
+            <a:r>
+              <a:rPr lang="en-US" dirty="0"/>
+              <a:t> </a:t>
+            </a:r>
+            <a:r>
+              <a:rPr lang="en-US" dirty="0" err="1"/>
+              <a:t>vergelijken</a:t>
+            </a:r>
+            <a:r>
+              <a:rPr lang="en-US" dirty="0"/>
+              <a:t> met </a:t>
             </a:r>
             <a:r>
               <a:rPr lang="en-US" dirty="0" err="1"/>
@@ -4207,39 +5577,77 @@
           </a:p>
           <a:p>
             <a:r>
-              <a:rPr lang="en-US" dirty="0" err="1" smtClean="0"/>
+              <a:rPr lang="en-US" dirty="0" err="1"/>
               <a:t>Samen</a:t>
             </a:r>
             <a:r>
-              <a:rPr lang="en-US" dirty="0" smtClean="0"/>
+              <a:rPr lang="en-US" dirty="0"/>
               <a:t> </a:t>
             </a:r>
             <a:r>
-              <a:rPr lang="en-US" dirty="0" err="1" smtClean="0"/>
-              <a:t>d</a:t>
-            </a:r>
-            <a:r>
-              <a:rPr lang="en-US" dirty="0" err="1" smtClean="0"/>
-              <a:t>elen</a:t>
-            </a:r>
-            <a:r>
-              <a:rPr lang="en-US" dirty="0" smtClean="0"/>
+              <a:rPr lang="en-US" dirty="0" err="1"/>
+              <a:t>delen</a:t>
+            </a:r>
+            <a:r>
+              <a:rPr lang="en-US" dirty="0"/>
               <a:t>:</a:t>
             </a:r>
+          </a:p>
+          <a:p>
+            <a:pPr lvl="1"/>
+            <a:r>
+              <a:rPr lang="en-US" dirty="0" err="1"/>
+              <a:t>Gebruikte</a:t>
+            </a:r>
+            <a:r>
+              <a:rPr lang="en-US" dirty="0"/>
+              <a:t> </a:t>
+            </a:r>
+            <a:r>
+              <a:rPr lang="en-US" dirty="0" err="1"/>
+              <a:t>vergelijkingen</a:t>
+            </a:r>
             <a:endParaRPr lang="en-US" dirty="0"/>
           </a:p>
           <a:p>
             <a:pPr lvl="1"/>
             <a:r>
-              <a:rPr lang="en-US" dirty="0" err="1" smtClean="0"/>
-              <a:t>Gebruikte</a:t>
-            </a:r>
-            <a:r>
-              <a:rPr lang="en-US" dirty="0" smtClean="0"/>
+              <a:rPr lang="en-US" dirty="0" err="1"/>
+              <a:t>Geaggregeerde</a:t>
+            </a:r>
+            <a:r>
+              <a:rPr lang="en-US" dirty="0"/>
               <a:t> </a:t>
             </a:r>
             <a:r>
               <a:rPr lang="en-US" dirty="0" err="1"/>
+              <a:t>resultaten</a:t>
+            </a:r>
+            <a:r>
+              <a:rPr lang="en-US" dirty="0"/>
+              <a:t> (</a:t>
+            </a:r>
+            <a:r>
+              <a:rPr lang="en-US" dirty="0" err="1"/>
+              <a:t>benchmarken</a:t>
+            </a:r>
+            <a:r>
+              <a:rPr lang="en-US" dirty="0"/>
+              <a:t>)</a:t>
+            </a:r>
+          </a:p>
+          <a:p>
+            <a:pPr lvl="1"/>
+            <a:r>
+              <a:rPr lang="en-US" dirty="0" err="1"/>
+              <a:t>Nieuwe</a:t>
+            </a:r>
+            <a:r>
+              <a:rPr lang="en-US" dirty="0"/>
+              <a:t>  </a:t>
+            </a:r>
+            <a:r>
+              <a:rPr lang="en-US" dirty="0" err="1"/>
               <a:t>vergelijkingen</a:t>
             </a:r>
             <a:endParaRPr lang="en-US" dirty="0"/>
@@ -4247,51 +5655,7 @@
           <a:p>
             <a:pPr lvl="1"/>
             <a:r>
-              <a:rPr lang="en-US" dirty="0" err="1" smtClean="0"/>
-              <a:t>Geaggregeerde</a:t>
-            </a:r>
-            <a:r>
-              <a:rPr lang="en-US" dirty="0" smtClean="0"/>
-              <a:t> </a:t>
-            </a:r>
-            <a:r>
-              <a:rPr lang="en-US" dirty="0" err="1" smtClean="0"/>
-              <a:t>resultaten</a:t>
-            </a:r>
-            <a:r>
-              <a:rPr lang="en-US" dirty="0" smtClean="0"/>
-              <a:t> (</a:t>
-            </a:r>
-            <a:r>
-              <a:rPr lang="en-US" dirty="0" err="1" smtClean="0"/>
-              <a:t>benchmarken</a:t>
-            </a:r>
-            <a:r>
-              <a:rPr lang="en-US" dirty="0" smtClean="0"/>
-              <a:t>)</a:t>
-            </a:r>
-            <a:endParaRPr lang="en-US" dirty="0"/>
-          </a:p>
-          <a:p>
-            <a:pPr lvl="1"/>
-            <a:r>
-              <a:rPr lang="en-US" dirty="0" err="1"/>
-              <a:t>Nieuwe</a:t>
-            </a:r>
-            <a:r>
-              <a:rPr lang="en-US" dirty="0"/>
-              <a:t>  </a:t>
-            </a:r>
-            <a:r>
-              <a:rPr lang="en-US" dirty="0" err="1" smtClean="0"/>
-              <a:t>vergelijkingen</a:t>
-            </a:r>
-            <a:endParaRPr lang="en-US" dirty="0" smtClean="0"/>
-          </a:p>
-          <a:p>
-            <a:pPr lvl="1"/>
-            <a:r>
-              <a:rPr lang="en-US" dirty="0" smtClean="0"/>
+              <a:rPr lang="en-US" dirty="0"/>
               <a:t>De software</a:t>
             </a:r>
           </a:p>
@@ -4301,67 +5665,67 @@
           </a:p>
           <a:p>
             <a:r>
-              <a:rPr lang="en-US" dirty="0" err="1" smtClean="0"/>
+              <a:rPr lang="en-US" dirty="0" err="1"/>
               <a:t>Kan</a:t>
             </a:r>
             <a:r>
-              <a:rPr lang="en-US" dirty="0" smtClean="0"/>
+              <a:rPr lang="en-US" dirty="0"/>
               <a:t> KING me </a:t>
             </a:r>
             <a:r>
-              <a:rPr lang="en-US" dirty="0" err="1" smtClean="0"/>
+              <a:rPr lang="en-US" dirty="0" err="1"/>
               <a:t>hierbij</a:t>
             </a:r>
             <a:r>
-              <a:rPr lang="en-US" dirty="0" smtClean="0"/>
+              <a:rPr lang="en-US" dirty="0"/>
               <a:t> </a:t>
             </a:r>
             <a:r>
-              <a:rPr lang="en-US" dirty="0" err="1" smtClean="0"/>
+              <a:rPr lang="en-US" dirty="0" err="1"/>
               <a:t>helpen</a:t>
             </a:r>
             <a:r>
-              <a:rPr lang="en-US" dirty="0" smtClean="0"/>
+              <a:rPr lang="en-US" dirty="0"/>
               <a:t> </a:t>
             </a:r>
             <a:r>
-              <a:rPr lang="en-US" dirty="0" err="1" smtClean="0"/>
+              <a:rPr lang="en-US" dirty="0" err="1"/>
               <a:t>om</a:t>
             </a:r>
             <a:r>
-              <a:rPr lang="en-US" dirty="0" smtClean="0"/>
+              <a:rPr lang="en-US" dirty="0"/>
               <a:t> </a:t>
             </a:r>
             <a:r>
-              <a:rPr lang="en-US" dirty="0" err="1" smtClean="0"/>
+              <a:rPr lang="en-US" dirty="0" err="1"/>
               <a:t>dit</a:t>
             </a:r>
             <a:r>
-              <a:rPr lang="en-US" dirty="0" smtClean="0"/>
+              <a:rPr lang="en-US" dirty="0"/>
               <a:t> </a:t>
             </a:r>
             <a:r>
-              <a:rPr lang="en-US" dirty="0" err="1" smtClean="0"/>
+              <a:rPr lang="en-US" dirty="0" err="1"/>
               <a:t>verder</a:t>
             </a:r>
             <a:r>
-              <a:rPr lang="en-US" dirty="0" smtClean="0"/>
+              <a:rPr lang="en-US" dirty="0"/>
               <a:t> </a:t>
             </a:r>
             <a:r>
-              <a:rPr lang="en-US" dirty="0" err="1" smtClean="0"/>
+              <a:rPr lang="en-US" dirty="0" err="1"/>
               <a:t>te</a:t>
             </a:r>
             <a:r>
-              <a:rPr lang="en-US" dirty="0" smtClean="0"/>
+              <a:rPr lang="en-US" dirty="0"/>
               <a:t> </a:t>
             </a:r>
             <a:r>
-              <a:rPr lang="en-US" dirty="0" err="1" smtClean="0"/>
+              <a:rPr lang="en-US" dirty="0" err="1"/>
               <a:t>delen</a:t>
             </a:r>
             <a:r>
-              <a:rPr lang="en-US" dirty="0" smtClean="0"/>
+              <a:rPr lang="en-US" dirty="0"/>
               <a:t>?</a:t>
             </a:r>
           </a:p>
@@ -4370,7 +5734,7 @@
               <a:buNone/>
             </a:pPr>
             <a:r>
-              <a:rPr lang="en-US" dirty="0" smtClean="0"/>
+              <a:rPr lang="en-US" dirty="0"/>
               <a:t>	</a:t>
             </a:r>
           </a:p>
@@ -4379,28 +5743,16 @@
               <a:buNone/>
             </a:pPr>
             <a:r>
-              <a:rPr lang="en-US" dirty="0" smtClean="0"/>
+              <a:rPr lang="en-US" dirty="0"/>
               <a:t>code:  </a:t>
             </a:r>
             <a:r>
-              <a:rPr lang="en-US" sz="2800" dirty="0" smtClean="0">
-                <a:hlinkClick r:id="rId2"/>
+              <a:rPr lang="en-US" sz="2800" dirty="0">
+                <a:hlinkClick r:id="rId3"/>
               </a:rPr>
-              <a:t>https</a:t>
-            </a:r>
-            <a:r>
-              <a:rPr lang="en-US" sz="2800" dirty="0">
-                <a:hlinkClick r:id="rId2"/>
-              </a:rPr>
-              <a:t>://</a:t>
-            </a:r>
-            <a:r>
-              <a:rPr lang="en-US" sz="2800" dirty="0" smtClean="0">
-                <a:hlinkClick r:id="rId2"/>
-              </a:rPr>
-              <a:t>github.com/EduardWitteveen/GegevensVergelijker</a:t>
-            </a:r>
-            <a:endParaRPr lang="en-US" sz="2800" dirty="0" smtClean="0"/>
+              <a:t>https://github.com/EduardWitteveen/GegevensVergelijker</a:t>
+            </a:r>
+            <a:endParaRPr lang="en-US" sz="2800" dirty="0"/>
           </a:p>
         </p:txBody>
       </p:sp>
@@ -4452,10 +5804,9 @@
           <a:lstStyle/>
           <a:p>
             <a:r>
-              <a:rPr lang="nl-NL" dirty="0" smtClean="0"/>
+              <a:rPr lang="nl-NL" dirty="0"/>
               <a:t>Mijn pilotstarter aanbod</a:t>
             </a:r>
-            <a:endParaRPr lang="nl-NL" dirty="0"/>
           </a:p>
         </p:txBody>
       </p:sp>
@@ -4482,153 +5833,149 @@
           <a:lstStyle/>
           <a:p>
             <a:r>
-              <a:rPr lang="en-US" dirty="0" smtClean="0"/>
-              <a:t>G</a:t>
-            </a:r>
-            <a:r>
-              <a:rPr lang="en-US" dirty="0" smtClean="0"/>
-              <a:t>egevensvergelijker monitoring tool</a:t>
+              <a:rPr lang="en-US" dirty="0"/>
+              <a:t>Gegevensvergelijker monitoring tool</a:t>
             </a:r>
           </a:p>
           <a:p>
             <a:pPr lvl="1"/>
             <a:r>
-              <a:rPr lang="en-US" dirty="0" smtClean="0"/>
+              <a:rPr lang="en-US" dirty="0"/>
               <a:t>I-Spiegel </a:t>
             </a:r>
             <a:r>
-              <a:rPr lang="en-US" dirty="0" err="1" smtClean="0"/>
+              <a:rPr lang="en-US" dirty="0" err="1"/>
               <a:t>als</a:t>
             </a:r>
             <a:r>
-              <a:rPr lang="en-US" dirty="0" smtClean="0"/>
+              <a:rPr lang="en-US" dirty="0"/>
               <a:t> </a:t>
             </a:r>
             <a:r>
-              <a:rPr lang="en-US" dirty="0" err="1" smtClean="0"/>
+              <a:rPr lang="en-US" dirty="0" err="1"/>
               <a:t>inspiratiebron</a:t>
             </a:r>
-            <a:endParaRPr lang="en-US" dirty="0" smtClean="0"/>
-          </a:p>
-          <a:p>
-            <a:r>
-              <a:rPr lang="en-US" dirty="0" err="1" smtClean="0"/>
+            <a:endParaRPr lang="en-US" dirty="0"/>
+          </a:p>
+          <a:p>
+            <a:r>
+              <a:rPr lang="en-US" dirty="0" err="1"/>
               <a:t>Dagelijkse</a:t>
             </a:r>
             <a:r>
-              <a:rPr lang="en-US" dirty="0" smtClean="0"/>
+              <a:rPr lang="en-US" dirty="0"/>
               <a:t> meting op </a:t>
             </a:r>
             <a:r>
-              <a:rPr lang="en-US" dirty="0" err="1" smtClean="0"/>
+              <a:rPr lang="en-US" dirty="0" err="1"/>
               <a:t>onze</a:t>
             </a:r>
             <a:r>
-              <a:rPr lang="en-US" dirty="0" smtClean="0"/>
+              <a:rPr lang="en-US" dirty="0"/>
               <a:t> </a:t>
             </a:r>
             <a:r>
-              <a:rPr lang="en-US" dirty="0" err="1" smtClean="0"/>
+              <a:rPr lang="en-US" dirty="0" err="1"/>
               <a:t>kwaliteit</a:t>
             </a:r>
             <a:endParaRPr lang="en-US" dirty="0"/>
           </a:p>
           <a:p>
             <a:r>
-              <a:rPr lang="en-US" dirty="0" smtClean="0"/>
+              <a:rPr lang="en-US" dirty="0"/>
               <a:t>Nu 4 </a:t>
             </a:r>
             <a:r>
-              <a:rPr lang="en-US" dirty="0" err="1" smtClean="0"/>
+              <a:rPr lang="en-US" dirty="0" err="1"/>
               <a:t>jaar</a:t>
             </a:r>
             <a:r>
-              <a:rPr lang="en-US" dirty="0" smtClean="0"/>
+              <a:rPr lang="en-US" dirty="0"/>
               <a:t> </a:t>
             </a:r>
             <a:r>
-              <a:rPr lang="en-US" dirty="0" err="1" smtClean="0"/>
+              <a:rPr lang="en-US" dirty="0" err="1"/>
               <a:t>historie</a:t>
             </a:r>
             <a:r>
-              <a:rPr lang="en-US" dirty="0" smtClean="0"/>
+              <a:rPr lang="en-US" dirty="0"/>
               <a:t> over de </a:t>
             </a:r>
             <a:r>
-              <a:rPr lang="en-US" dirty="0" err="1" smtClean="0"/>
+              <a:rPr lang="en-US" dirty="0" err="1"/>
               <a:t>gegevenskwaliteit</a:t>
             </a:r>
-            <a:endParaRPr lang="en-US" dirty="0" smtClean="0"/>
-          </a:p>
-          <a:p>
-            <a:r>
-              <a:rPr lang="en-US" dirty="0" smtClean="0"/>
+            <a:endParaRPr lang="en-US" dirty="0"/>
+          </a:p>
+          <a:p>
+            <a:r>
+              <a:rPr lang="en-US" dirty="0"/>
               <a:t>Nu 4 </a:t>
             </a:r>
             <a:r>
-              <a:rPr lang="en-US" dirty="0" err="1" smtClean="0"/>
+              <a:rPr lang="en-US" dirty="0" err="1"/>
               <a:t>jaar</a:t>
             </a:r>
             <a:r>
-              <a:rPr lang="en-US" dirty="0" smtClean="0"/>
+              <a:rPr lang="en-US" dirty="0"/>
               <a:t> </a:t>
             </a:r>
             <a:r>
-              <a:rPr lang="en-US" dirty="0" err="1" smtClean="0"/>
+              <a:rPr lang="en-US" dirty="0" err="1"/>
               <a:t>gestuurd</a:t>
             </a:r>
             <a:r>
-              <a:rPr lang="en-US" dirty="0" smtClean="0"/>
+              <a:rPr lang="en-US" dirty="0"/>
               <a:t>, </a:t>
             </a:r>
             <a:r>
-              <a:rPr lang="en-US" dirty="0" err="1" smtClean="0"/>
+              <a:rPr lang="en-US" dirty="0" err="1"/>
               <a:t>advies</a:t>
             </a:r>
             <a:r>
-              <a:rPr lang="en-US" dirty="0" smtClean="0"/>
+              <a:rPr lang="en-US" dirty="0"/>
               <a:t> en </a:t>
             </a:r>
             <a:r>
-              <a:rPr lang="en-US" dirty="0" err="1" smtClean="0"/>
+              <a:rPr lang="en-US" dirty="0" err="1"/>
               <a:t>afstemming</a:t>
             </a:r>
             <a:r>
-              <a:rPr lang="en-US" dirty="0" smtClean="0"/>
+              <a:rPr lang="en-US" dirty="0"/>
               <a:t> met </a:t>
             </a:r>
             <a:r>
-              <a:rPr lang="en-US" dirty="0" err="1" smtClean="0"/>
+              <a:rPr lang="en-US" dirty="0" err="1"/>
               <a:t>andere</a:t>
             </a:r>
             <a:r>
-              <a:rPr lang="en-US" dirty="0" smtClean="0"/>
+              <a:rPr lang="en-US" dirty="0"/>
               <a:t> </a:t>
             </a:r>
             <a:r>
-              <a:rPr lang="en-US" dirty="0" err="1" smtClean="0"/>
+              <a:rPr lang="en-US" dirty="0" err="1"/>
               <a:t>afdelingen</a:t>
             </a:r>
             <a:r>
-              <a:rPr lang="en-US" dirty="0" smtClean="0"/>
+              <a:rPr lang="en-US" dirty="0"/>
               <a:t> over de </a:t>
             </a:r>
             <a:r>
-              <a:rPr lang="en-US" dirty="0" err="1" smtClean="0"/>
+              <a:rPr lang="en-US" dirty="0" err="1"/>
               <a:t>gegevenskwaliteit</a:t>
             </a:r>
             <a:endParaRPr lang="en-US" dirty="0"/>
           </a:p>
           <a:p>
             <a:r>
-              <a:rPr lang="en-US" dirty="0" smtClean="0"/>
+              <a:rPr lang="en-US" dirty="0"/>
               <a:t>Wens : </a:t>
             </a:r>
           </a:p>
           <a:p>
             <a:pPr lvl="1"/>
             <a:r>
-              <a:rPr lang="en-US" dirty="0" err="1" smtClean="0"/>
+              <a:rPr lang="en-US" dirty="0" err="1"/>
               <a:t>Vergelijken</a:t>
             </a:r>
             <a:r>
@@ -4637,76 +5984,68 @@
             </a:r>
             <a:r>
               <a:rPr lang="en-US" dirty="0" err="1"/>
-              <a:t>k</a:t>
-            </a:r>
-            <a:r>
-              <a:rPr lang="en-US" dirty="0" err="1" smtClean="0"/>
-              <a:t>waliteit</a:t>
-            </a:r>
-            <a:r>
-              <a:rPr lang="en-US" dirty="0" smtClean="0"/>
+              <a:t>kwaliteit</a:t>
+            </a:r>
+            <a:r>
+              <a:rPr lang="en-US" dirty="0"/>
+              <a:t> met </a:t>
+            </a:r>
+            <a:r>
+              <a:rPr lang="en-US" dirty="0" err="1"/>
+              <a:t>andere</a:t>
+            </a:r>
+            <a:r>
+              <a:rPr lang="en-US" dirty="0"/>
               <a:t> </a:t>
             </a:r>
             <a:r>
-              <a:rPr lang="en-US" dirty="0" smtClean="0"/>
-              <a:t>met </a:t>
-            </a:r>
-            <a:r>
-              <a:rPr lang="en-US" dirty="0" err="1" smtClean="0"/>
-              <a:t>andere</a:t>
-            </a:r>
-            <a:r>
-              <a:rPr lang="en-US" dirty="0" smtClean="0"/>
-              <a:t> </a:t>
-            </a:r>
-            <a:r>
-              <a:rPr lang="en-US" dirty="0" err="1" smtClean="0"/>
+              <a:rPr lang="en-US" dirty="0" err="1"/>
               <a:t>gemeenten</a:t>
             </a:r>
             <a:r>
-              <a:rPr lang="en-US" dirty="0" smtClean="0"/>
+              <a:rPr lang="en-US" dirty="0"/>
               <a:t> (</a:t>
             </a:r>
             <a:r>
-              <a:rPr lang="en-US" dirty="0" err="1" smtClean="0"/>
+              <a:rPr lang="en-US" dirty="0" err="1"/>
               <a:t>benchmarken</a:t>
             </a:r>
             <a:r>
-              <a:rPr lang="en-US" dirty="0" smtClean="0"/>
+              <a:rPr lang="en-US" dirty="0"/>
               <a:t>)</a:t>
             </a:r>
           </a:p>
           <a:p>
             <a:pPr lvl="1"/>
             <a:r>
-              <a:rPr lang="en-US" dirty="0" err="1" smtClean="0"/>
+              <a:rPr lang="en-US" dirty="0" err="1"/>
               <a:t>Delen</a:t>
             </a:r>
             <a:r>
-              <a:rPr lang="en-US" dirty="0" smtClean="0"/>
+              <a:rPr lang="en-US" dirty="0"/>
               <a:t> van de </a:t>
             </a:r>
             <a:r>
-              <a:rPr lang="en-US" dirty="0" err="1" smtClean="0"/>
+              <a:rPr lang="en-US" dirty="0" err="1"/>
               <a:t>vergelijkingen</a:t>
             </a:r>
-            <a:endParaRPr lang="en-US" dirty="0" smtClean="0"/>
+            <a:endParaRPr lang="en-US" dirty="0"/>
           </a:p>
           <a:p>
             <a:pPr lvl="1"/>
             <a:r>
-              <a:rPr lang="en-US" dirty="0" err="1" smtClean="0"/>
+              <a:rPr lang="en-US" dirty="0" err="1"/>
               <a:t>Delen</a:t>
             </a:r>
             <a:r>
-              <a:rPr lang="en-US" dirty="0" smtClean="0"/>
+              <a:rPr lang="en-US" dirty="0"/>
               <a:t> van de </a:t>
             </a:r>
             <a:r>
-              <a:rPr lang="en-US" dirty="0" err="1" smtClean="0"/>
+              <a:rPr lang="en-US" dirty="0" err="1"/>
               <a:t>applicatie</a:t>
             </a:r>
-            <a:endParaRPr lang="en-US" dirty="0" smtClean="0"/>
+            <a:endParaRPr lang="en-US" dirty="0"/>
           </a:p>
           <a:p>
             <a:endParaRPr lang="en-US" dirty="0"/>
@@ -4879,102 +6218,6 @@
           <a:bodyPr/>
           <a:lstStyle/>
           <a:p>
-            <a:endParaRPr lang="en-US" dirty="0"/>
-          </a:p>
-        </p:txBody>
-      </p:sp>
-      <p:sp>
-        <p:nvSpPr>
-          <p:cNvPr id="4" name="Titel 3"/>
-          <p:cNvSpPr>
-            <a:spLocks noGrp="1"/>
-          </p:cNvSpPr>
-          <p:nvPr>
-            <p:ph type="title"/>
-          </p:nvPr>
-        </p:nvSpPr>
-        <p:spPr/>
-        <p:txBody>
-          <a:bodyPr/>
-          <a:lstStyle/>
-          <a:p>
-            <a:r>
-              <a:rPr lang="en-US" dirty="0" smtClean="0"/>
-              <a:t>Benchmarking in 2013</a:t>
-            </a:r>
-            <a:endParaRPr lang="en-US" dirty="0"/>
-          </a:p>
-        </p:txBody>
-      </p:sp>
-      <p:pic>
-        <p:nvPicPr>
-          <p:cNvPr id="2" name="Afbeelding 1"/>
-          <p:cNvPicPr>
-            <a:picLocks noChangeAspect="1"/>
-          </p:cNvPicPr>
-          <p:nvPr/>
-        </p:nvPicPr>
-        <p:blipFill>
-          <a:blip r:embed="rId2"/>
-          <a:stretch>
-            <a:fillRect/>
-          </a:stretch>
-        </p:blipFill>
-        <p:spPr>
-          <a:xfrm>
-            <a:off x="2267744" y="1417638"/>
-            <a:ext cx="4896544" cy="4837312"/>
-          </a:xfrm>
-          <a:prstGeom prst="rect">
-            <a:avLst/>
-          </a:prstGeom>
-        </p:spPr>
-      </p:pic>
-    </p:spTree>
-    <p:extLst>
-      <p:ext uri="{BB962C8B-B14F-4D97-AF65-F5344CB8AC3E}">
-        <p14:creationId xmlns:p14="http://schemas.microsoft.com/office/powerpoint/2010/main" val="3371160242"/>
-      </p:ext>
-    </p:extLst>
-  </p:cSld>
-  <p:clrMapOvr>
-    <a:masterClrMapping/>
-  </p:clrMapOvr>
-</p:sld>
-</file>
-
-<file path=ppt/slides/slide5.xml><?xml version="1.0" encoding="utf-8"?>
-<p:sld xmlns:a="http://schemas.openxmlformats.org/drawingml/2006/main" xmlns:r="http://schemas.openxmlformats.org/officeDocument/2006/relationships" xmlns:p="http://schemas.openxmlformats.org/presentationml/2006/main">
-  <p:cSld>
-    <p:spTree>
-      <p:nvGrpSpPr>
-        <p:cNvPr id="1" name=""/>
-        <p:cNvGrpSpPr/>
-        <p:nvPr/>
-      </p:nvGrpSpPr>
-      <p:grpSpPr>
-        <a:xfrm>
-          <a:off x="0" y="0"/>
-          <a:ext cx="0" cy="0"/>
-          <a:chOff x="0" y="0"/>
-          <a:chExt cx="0" cy="0"/>
-        </a:xfrm>
-      </p:grpSpPr>
-      <p:sp>
-        <p:nvSpPr>
-          <p:cNvPr id="3" name="Tijdelijke aanduiding voor inhoud 2"/>
-          <p:cNvSpPr>
-            <a:spLocks noGrp="1"/>
-          </p:cNvSpPr>
-          <p:nvPr>
-            <p:ph idx="1"/>
-          </p:nvPr>
-        </p:nvSpPr>
-        <p:spPr/>
-        <p:txBody>
-          <a:bodyPr/>
-          <a:lstStyle/>
-          <a:p>
             <a:pPr marL="0" indent="0">
               <a:buNone/>
             </a:pPr>
@@ -5009,14 +6252,13 @@
           <a:lstStyle/>
           <a:p>
             <a:r>
-              <a:rPr lang="en-US" dirty="0" err="1" smtClean="0"/>
+              <a:rPr lang="en-US" dirty="0" err="1"/>
               <a:t>Trendlijn</a:t>
             </a:r>
             <a:r>
-              <a:rPr lang="en-US" dirty="0" smtClean="0"/>
+              <a:rPr lang="en-US" dirty="0"/>
               <a:t> in 2013</a:t>
             </a:r>
-            <a:endParaRPr lang="en-US" dirty="0"/>
           </a:p>
         </p:txBody>
       </p:sp>
@@ -5057,6 +6299,101 @@
 </p:sld>
 </file>
 
+<file path=ppt/slides/slide5.xml><?xml version="1.0" encoding="utf-8"?>
+<p:sld xmlns:a="http://schemas.openxmlformats.org/drawingml/2006/main" xmlns:r="http://schemas.openxmlformats.org/officeDocument/2006/relationships" xmlns:p="http://schemas.openxmlformats.org/presentationml/2006/main">
+  <p:cSld>
+    <p:spTree>
+      <p:nvGrpSpPr>
+        <p:cNvPr id="1" name=""/>
+        <p:cNvGrpSpPr/>
+        <p:nvPr/>
+      </p:nvGrpSpPr>
+      <p:grpSpPr>
+        <a:xfrm>
+          <a:off x="0" y="0"/>
+          <a:ext cx="0" cy="0"/>
+          <a:chOff x="0" y="0"/>
+          <a:chExt cx="0" cy="0"/>
+        </a:xfrm>
+      </p:grpSpPr>
+      <p:sp>
+        <p:nvSpPr>
+          <p:cNvPr id="3" name="Tijdelijke aanduiding voor inhoud 2"/>
+          <p:cNvSpPr>
+            <a:spLocks noGrp="1"/>
+          </p:cNvSpPr>
+          <p:nvPr>
+            <p:ph idx="1"/>
+          </p:nvPr>
+        </p:nvSpPr>
+        <p:spPr/>
+        <p:txBody>
+          <a:bodyPr/>
+          <a:lstStyle/>
+          <a:p>
+            <a:endParaRPr lang="en-US" dirty="0"/>
+          </a:p>
+        </p:txBody>
+      </p:sp>
+      <p:sp>
+        <p:nvSpPr>
+          <p:cNvPr id="4" name="Titel 3"/>
+          <p:cNvSpPr>
+            <a:spLocks noGrp="1"/>
+          </p:cNvSpPr>
+          <p:nvPr>
+            <p:ph type="title"/>
+          </p:nvPr>
+        </p:nvSpPr>
+        <p:spPr/>
+        <p:txBody>
+          <a:bodyPr/>
+          <a:lstStyle/>
+          <a:p>
+            <a:r>
+              <a:rPr lang="en-US" dirty="0"/>
+              <a:t>Benchmarking in 2013</a:t>
+            </a:r>
+          </a:p>
+        </p:txBody>
+      </p:sp>
+      <p:pic>
+        <p:nvPicPr>
+          <p:cNvPr id="2" name="Afbeelding 1"/>
+          <p:cNvPicPr>
+            <a:picLocks noChangeAspect="1"/>
+          </p:cNvPicPr>
+          <p:nvPr/>
+        </p:nvPicPr>
+        <p:blipFill>
+          <a:blip r:embed="rId3"/>
+          <a:stretch>
+            <a:fillRect/>
+          </a:stretch>
+        </p:blipFill>
+        <p:spPr>
+          <a:xfrm>
+            <a:off x="2267744" y="1417638"/>
+            <a:ext cx="4896544" cy="4837312"/>
+          </a:xfrm>
+          <a:prstGeom prst="rect">
+            <a:avLst/>
+          </a:prstGeom>
+        </p:spPr>
+      </p:pic>
+    </p:spTree>
+    <p:extLst>
+      <p:ext uri="{BB962C8B-B14F-4D97-AF65-F5344CB8AC3E}">
+        <p14:creationId xmlns:p14="http://schemas.microsoft.com/office/powerpoint/2010/main" val="3371160242"/>
+      </p:ext>
+    </p:extLst>
+  </p:cSld>
+  <p:clrMapOvr>
+    <a:masterClrMapping/>
+  </p:clrMapOvr>
+</p:sld>
+</file>
+
 <file path=ppt/slides/slide6.xml><?xml version="1.0" encoding="utf-8"?>
 <p:sld xmlns:a="http://schemas.openxmlformats.org/drawingml/2006/main" xmlns:r="http://schemas.openxmlformats.org/officeDocument/2006/relationships" xmlns:p="http://schemas.openxmlformats.org/presentationml/2006/main">
   <p:cSld>
@@ -5087,230 +6424,64 @@
         <p:spPr/>
         <p:txBody>
           <a:bodyPr>
-            <a:normAutofit lnSpcReduction="10000"/>
+            <a:normAutofit fontScale="92500"/>
           </a:bodyPr>
           <a:lstStyle/>
           <a:p>
             <a:r>
-              <a:rPr lang="en-US" dirty="0" err="1" smtClean="0"/>
-              <a:t>Bij</a:t>
-            </a:r>
-            <a:r>
-              <a:rPr lang="en-US" dirty="0" smtClean="0"/>
-              <a:t> </a:t>
-            </a:r>
-            <a:r>
-              <a:rPr lang="en-US" dirty="0" err="1"/>
-              <a:t>negatieve</a:t>
-            </a:r>
-            <a:r>
-              <a:rPr lang="en-US" dirty="0"/>
-              <a:t> trend in de </a:t>
-            </a:r>
-            <a:r>
-              <a:rPr lang="en-US" dirty="0" err="1"/>
-              <a:t>vergelijking</a:t>
-            </a:r>
-            <a:r>
-              <a:rPr lang="en-US" dirty="0"/>
-              <a:t>:</a:t>
+              <a:rPr lang="nl-NL" dirty="0"/>
+              <a:t>Bij negatieve trend in de vergelijking:</a:t>
             </a:r>
           </a:p>
           <a:p>
             <a:pPr lvl="1"/>
             <a:r>
-              <a:rPr lang="en-US" dirty="0" err="1"/>
-              <a:t>Aanpassen</a:t>
-            </a:r>
-            <a:r>
-              <a:rPr lang="en-US" dirty="0"/>
-              <a:t> </a:t>
-            </a:r>
-            <a:r>
-              <a:rPr lang="en-US" dirty="0" err="1"/>
-              <a:t>werkwijze</a:t>
-            </a:r>
-            <a:r>
-              <a:rPr lang="en-US" dirty="0"/>
-              <a:t> (</a:t>
-            </a:r>
-            <a:r>
-              <a:rPr lang="en-US" dirty="0" err="1"/>
-              <a:t>werk</a:t>
-            </a:r>
-            <a:r>
-              <a:rPr lang="en-US" dirty="0"/>
-              <a:t> </a:t>
-            </a:r>
-            <a:r>
-              <a:rPr lang="en-US" dirty="0" err="1"/>
-              <a:t>processen</a:t>
-            </a:r>
-            <a:r>
-              <a:rPr lang="en-US" dirty="0"/>
-              <a:t>)</a:t>
+              <a:rPr lang="nl-NL" dirty="0"/>
+              <a:t>Aanpassen werkwijze (werk processen)</a:t>
             </a:r>
           </a:p>
           <a:p>
             <a:pPr lvl="1"/>
             <a:r>
-              <a:rPr lang="en-US" dirty="0" err="1"/>
-              <a:t>Aanpassen</a:t>
-            </a:r>
-            <a:r>
-              <a:rPr lang="en-US" dirty="0"/>
-              <a:t> </a:t>
-            </a:r>
-            <a:r>
-              <a:rPr lang="en-US" dirty="0" err="1"/>
-              <a:t>koppelingen</a:t>
-            </a:r>
-            <a:r>
-              <a:rPr lang="en-US" dirty="0"/>
-              <a:t> (</a:t>
-            </a:r>
-            <a:r>
-              <a:rPr lang="en-US" dirty="0" err="1"/>
-              <a:t>berichtenverkeer</a:t>
-            </a:r>
-            <a:r>
-              <a:rPr lang="en-US" dirty="0"/>
-              <a:t>)</a:t>
+              <a:rPr lang="nl-NL" dirty="0"/>
+              <a:t>Aanpassen koppelingen (berichtenverkeer)</a:t>
             </a:r>
           </a:p>
           <a:p>
             <a:pPr lvl="1"/>
             <a:r>
-              <a:rPr lang="en-US" dirty="0" err="1"/>
-              <a:t>Aanpassen</a:t>
-            </a:r>
-            <a:r>
-              <a:rPr lang="en-US" dirty="0"/>
-              <a:t> </a:t>
-            </a:r>
-            <a:r>
-              <a:rPr lang="en-US" dirty="0" err="1"/>
-              <a:t>applicatie</a:t>
-            </a:r>
-            <a:r>
-              <a:rPr lang="en-US" dirty="0"/>
-              <a:t> (bugs)</a:t>
+              <a:rPr lang="nl-NL" dirty="0"/>
+              <a:t>Aanpassen applicatie (bugs)</a:t>
             </a:r>
           </a:p>
           <a:p>
             <a:pPr lvl="1"/>
             <a:r>
-              <a:rPr lang="en-US" dirty="0" err="1"/>
-              <a:t>Accepteren</a:t>
-            </a:r>
-            <a:r>
-              <a:rPr lang="en-US" dirty="0"/>
-              <a:t> en </a:t>
-            </a:r>
-            <a:r>
-              <a:rPr lang="en-US" dirty="0" err="1" smtClean="0"/>
-              <a:t>bijstellen</a:t>
-            </a:r>
-            <a:endParaRPr lang="en-US" dirty="0" smtClean="0"/>
+              <a:rPr lang="nl-NL" dirty="0"/>
+              <a:t>Accepteren en bijstellen</a:t>
+            </a:r>
           </a:p>
           <a:p>
             <a:pPr marL="457200" lvl="1" indent="0">
               <a:buNone/>
             </a:pPr>
-            <a:endParaRPr lang="en-US" dirty="0"/>
-          </a:p>
-          <a:p>
-            <a:r>
-              <a:rPr lang="en-US" dirty="0" err="1"/>
-              <a:t>Bij</a:t>
-            </a:r>
-            <a:r>
-              <a:rPr lang="en-US" dirty="0"/>
-              <a:t> </a:t>
-            </a:r>
-            <a:r>
-              <a:rPr lang="en-US" dirty="0" err="1"/>
-              <a:t>nieuwe</a:t>
-            </a:r>
-            <a:r>
-              <a:rPr lang="en-US" dirty="0"/>
-              <a:t> “</a:t>
-            </a:r>
-            <a:r>
-              <a:rPr lang="en-US" dirty="0" err="1"/>
-              <a:t>problemen</a:t>
-            </a:r>
-            <a:r>
-              <a:rPr lang="en-US" dirty="0"/>
-              <a:t>” in de </a:t>
-            </a:r>
-            <a:r>
-              <a:rPr lang="en-US" dirty="0" err="1"/>
-              <a:t>organisatie</a:t>
-            </a:r>
-            <a:endParaRPr lang="en-US" dirty="0"/>
+            <a:endParaRPr lang="nl-NL" dirty="0"/>
+          </a:p>
+          <a:p>
+            <a:r>
+              <a:rPr lang="nl-NL" dirty="0"/>
+              <a:t>Bij nieuwe “problemen” in de organisatie</a:t>
+            </a:r>
           </a:p>
           <a:p>
             <a:pPr lvl="1"/>
             <a:r>
-              <a:rPr lang="en-US" dirty="0" err="1"/>
-              <a:t>Wordt</a:t>
-            </a:r>
-            <a:r>
-              <a:rPr lang="en-US" dirty="0"/>
-              <a:t> </a:t>
-            </a:r>
-            <a:r>
-              <a:rPr lang="en-US" dirty="0" err="1"/>
-              <a:t>er</a:t>
-            </a:r>
-            <a:r>
-              <a:rPr lang="en-US" dirty="0"/>
-              <a:t> </a:t>
-            </a:r>
-            <a:r>
-              <a:rPr lang="en-US" dirty="0" err="1"/>
-              <a:t>samen</a:t>
-            </a:r>
-            <a:r>
-              <a:rPr lang="en-US" dirty="0"/>
-              <a:t> met de </a:t>
-            </a:r>
-            <a:r>
-              <a:rPr lang="en-US" dirty="0" err="1"/>
-              <a:t>gegevenseigenaar</a:t>
-            </a:r>
-            <a:r>
-              <a:rPr lang="en-US" dirty="0"/>
-              <a:t> </a:t>
-            </a:r>
-            <a:r>
-              <a:rPr lang="en-US" dirty="0" err="1"/>
-              <a:t>een</a:t>
-            </a:r>
-            <a:r>
-              <a:rPr lang="en-US" dirty="0"/>
-              <a:t> </a:t>
-            </a:r>
-            <a:r>
-              <a:rPr lang="en-US" dirty="0" err="1"/>
-              <a:t>vergelijking</a:t>
-            </a:r>
-            <a:r>
-              <a:rPr lang="en-US" dirty="0"/>
-              <a:t> </a:t>
-            </a:r>
-            <a:r>
-              <a:rPr lang="en-US" dirty="0" err="1"/>
-              <a:t>toegevoegd</a:t>
-            </a:r>
-            <a:r>
-              <a:rPr lang="en-US" dirty="0"/>
-              <a:t>.</a:t>
-            </a:r>
-          </a:p>
-          <a:p>
-            <a:endParaRPr lang="en-US" dirty="0"/>
+              <a:rPr lang="nl-NL" dirty="0"/>
+              <a:t>Wordt er samen met de gegevenseigenaar en gegevensgebruiker een vergelijking toegevoegd.</a:t>
+            </a:r>
+          </a:p>
+          <a:p>
+            <a:endParaRPr lang="nl-NL" dirty="0"/>
           </a:p>
         </p:txBody>
       </p:sp>
@@ -5330,26 +6501,9 @@
           <a:lstStyle/>
           <a:p>
             <a:r>
-              <a:rPr lang="en-US" dirty="0" err="1"/>
-              <a:t>Gebruik</a:t>
-            </a:r>
-            <a:r>
-              <a:rPr lang="en-US" dirty="0"/>
-              <a:t> </a:t>
-            </a:r>
-            <a:r>
-              <a:rPr lang="en-US" dirty="0" err="1"/>
-              <a:t>binnen</a:t>
-            </a:r>
-            <a:r>
-              <a:rPr lang="en-US" dirty="0"/>
-              <a:t> de </a:t>
-            </a:r>
-            <a:r>
-              <a:rPr lang="en-US" dirty="0" err="1"/>
-              <a:t>organisatie</a:t>
-            </a:r>
-            <a:endParaRPr lang="en-US" dirty="0"/>
+              <a:rPr lang="nl-NL" dirty="0"/>
+              <a:t>Gebruik binnen de organisatie</a:t>
+            </a:r>
           </a:p>
         </p:txBody>
       </p:sp>
@@ -5420,13 +6574,8 @@
             </a:r>
             <a:r>
               <a:rPr lang="en-US" dirty="0"/>
-              <a:t> </a:t>
-            </a:r>
-            <a:r>
-              <a:rPr lang="en-US" dirty="0" smtClean="0"/>
-              <a:t>2016</a:t>
-            </a:r>
-            <a:endParaRPr lang="en-US" dirty="0"/>
+              <a:t> 2016</a:t>
+            </a:r>
           </a:p>
         </p:txBody>
       </p:sp>
@@ -5519,14 +6668,13 @@
           <a:lstStyle/>
           <a:p>
             <a:r>
-              <a:rPr lang="en-US" dirty="0" err="1" smtClean="0"/>
+              <a:rPr lang="en-US" dirty="0" err="1"/>
               <a:t>Analyse</a:t>
             </a:r>
             <a:r>
-              <a:rPr lang="en-US" dirty="0" smtClean="0"/>
+              <a:rPr lang="en-US" dirty="0"/>
               <a:t> in 2016</a:t>
             </a:r>
-            <a:endParaRPr lang="en-US" dirty="0"/>
           </a:p>
         </p:txBody>
       </p:sp>
@@ -5546,25 +6694,16 @@
           <a:lstStyle/>
           <a:p>
             <a:r>
-              <a:rPr lang="en-US" dirty="0" smtClean="0"/>
-              <a:t>Over </a:t>
-            </a:r>
-            <a:r>
-              <a:rPr lang="en-US" dirty="0"/>
-              <a:t>2.232.656.628 </a:t>
-            </a:r>
-            <a:r>
-              <a:rPr lang="en-US" dirty="0" smtClean="0"/>
-              <a:t>records </a:t>
-            </a:r>
-            <a:endParaRPr lang="en-US" dirty="0"/>
+              <a:rPr lang="en-US" dirty="0"/>
+              <a:t>Over 2.232.656.628 records </a:t>
+            </a:r>
           </a:p>
         </p:txBody>
       </p:sp>
       <p:pic>
         <p:nvPicPr>
           <p:cNvPr id="1026" name="Picture 2">
-            <a:hlinkClick r:id="rId2" action="ppaction://hlinkfile"/>
+            <a:hlinkClick r:id="rId3" action="ppaction://hlinkfile"/>
           </p:cNvPr>
           <p:cNvPicPr>
             <a:picLocks noChangeAspect="1" noChangeArrowheads="1"/>
@@ -5572,7 +6711,7 @@
           <p:nvPr/>
         </p:nvPicPr>
         <p:blipFill>
-          <a:blip r:embed="rId3" cstate="print">
+          <a:blip r:embed="rId4" cstate="print">
             <a:extLst>
               <a:ext uri="{28A0092B-C50C-407E-A947-70E740481C1C}">
                 <a14:useLocalDpi xmlns:a14="http://schemas.microsoft.com/office/drawing/2010/main" val="0"/>
@@ -5673,18 +6812,17 @@
           <a:lstStyle/>
           <a:p>
             <a:r>
-              <a:rPr lang="en-US" dirty="0" smtClean="0"/>
+              <a:rPr lang="en-US" dirty="0"/>
               <a:t>Stand van </a:t>
             </a:r>
             <a:r>
-              <a:rPr lang="en-US" dirty="0" err="1" smtClean="0"/>
+              <a:rPr lang="en-US" dirty="0" err="1"/>
               <a:t>zaken</a:t>
             </a:r>
             <a:r>
-              <a:rPr lang="en-US" dirty="0" smtClean="0"/>
-              <a:t> in 22016</a:t>
-            </a:r>
-            <a:endParaRPr lang="en-US" dirty="0"/>
+              <a:rPr lang="en-US" dirty="0"/>
+              <a:t> in 2016</a:t>
+            </a:r>
           </a:p>
         </p:txBody>
       </p:sp>
@@ -5705,15 +6843,15 @@
           </a:bodyPr>
           <a:lstStyle/>
           <a:p>
-            <a:endParaRPr lang="en-US" dirty="0" smtClean="0"/>
-          </a:p>
-          <a:p>
-            <a:r>
-              <a:rPr lang="en-US" dirty="0" err="1" smtClean="0"/>
+            <a:endParaRPr lang="en-US" dirty="0"/>
+          </a:p>
+          <a:p>
+            <a:r>
+              <a:rPr lang="en-US" dirty="0" err="1"/>
               <a:t>Nieuwe</a:t>
             </a:r>
             <a:r>
-              <a:rPr lang="en-US" dirty="0" smtClean="0"/>
+              <a:rPr lang="en-US" dirty="0"/>
               <a:t> </a:t>
             </a:r>
             <a:r>
@@ -5747,59 +6885,65 @@
           </a:p>
           <a:p>
             <a:r>
-              <a:rPr lang="en-US" dirty="0" err="1" smtClean="0"/>
+              <a:rPr lang="en-US" dirty="0" err="1"/>
               <a:t>Meerdere</a:t>
             </a:r>
             <a:r>
-              <a:rPr lang="en-US" dirty="0" smtClean="0"/>
+              <a:rPr lang="en-US" dirty="0"/>
               <a:t> </a:t>
             </a:r>
             <a:r>
               <a:rPr lang="en-US" dirty="0" err="1"/>
-              <a:t>r</a:t>
-            </a:r>
-            <a:r>
-              <a:rPr lang="en-US" dirty="0" err="1" smtClean="0"/>
-              <a:t>apportages</a:t>
-            </a:r>
-            <a:r>
-              <a:rPr lang="en-US" dirty="0" smtClean="0"/>
+              <a:t>rapportages</a:t>
+            </a:r>
+            <a:r>
+              <a:rPr lang="en-US" dirty="0"/>
+              <a:t> (</a:t>
+            </a:r>
+            <a:r>
+              <a:rPr lang="en-US" dirty="0" err="1"/>
+              <a:t>Cognos</a:t>
+            </a:r>
+            <a:r>
+              <a:rPr lang="en-US" dirty="0"/>
+              <a:t>, </a:t>
+            </a:r>
+            <a:r>
+              <a:rPr lang="en-US" dirty="0" err="1"/>
+              <a:t>Qlik</a:t>
+            </a:r>
+            <a:r>
+              <a:rPr lang="en-US" dirty="0"/>
+              <a:t> Sense)</a:t>
+            </a:r>
+          </a:p>
+          <a:p>
+            <a:r>
+              <a:rPr lang="en-US" dirty="0" err="1"/>
+              <a:t>Nog</a:t>
+            </a:r>
+            <a:r>
+              <a:rPr lang="en-US" dirty="0"/>
+              <a:t> steeds de </a:t>
+            </a:r>
+            <a:r>
+              <a:rPr lang="en-US" dirty="0" err="1"/>
+              <a:t>maandelijkse</a:t>
+            </a:r>
+            <a:r>
+              <a:rPr lang="en-US" dirty="0"/>
               <a:t> </a:t>
             </a:r>
             <a:r>
-              <a:rPr lang="en-US" dirty="0" smtClean="0"/>
-              <a:t>(</a:t>
-            </a:r>
-            <a:r>
-              <a:rPr lang="en-US" dirty="0" err="1" smtClean="0"/>
-              <a:t>Cognos</a:t>
-            </a:r>
-            <a:r>
-              <a:rPr lang="en-US" dirty="0" smtClean="0"/>
-              <a:t>, </a:t>
-            </a:r>
-            <a:r>
-              <a:rPr lang="en-US" dirty="0" err="1" smtClean="0"/>
-              <a:t>Qlik</a:t>
-            </a:r>
-            <a:r>
-              <a:rPr lang="en-US" dirty="0" smtClean="0"/>
-              <a:t> Sense)</a:t>
+              <a:rPr lang="en-US" dirty="0" err="1"/>
+              <a:t>rapportage</a:t>
             </a:r>
             <a:endParaRPr lang="en-US" dirty="0"/>
           </a:p>
           <a:p>
             <a:r>
               <a:rPr lang="en-US" dirty="0" err="1"/>
-              <a:t>Nog</a:t>
-            </a:r>
-            <a:r>
-              <a:rPr lang="en-US" dirty="0"/>
-              <a:t> steeds de </a:t>
-            </a:r>
-            <a:r>
-              <a:rPr lang="en-US" dirty="0" err="1"/>
-              <a:t>maandelijkse</a:t>
+              <a:t>Dagelijks</a:t>
             </a:r>
             <a:r>
               <a:rPr lang="en-US" dirty="0"/>
@@ -5807,44 +6951,25 @@
             </a:r>
             <a:r>
               <a:rPr lang="en-US" dirty="0" err="1"/>
-              <a:t>rapportage</a:t>
+              <a:t>geautomatiseerde</a:t>
+            </a:r>
+            <a:r>
+              <a:rPr lang="en-US" dirty="0"/>
+              <a:t> </a:t>
+            </a:r>
+            <a:r>
+              <a:rPr lang="en-US" dirty="0" err="1"/>
+              <a:t>vergelijking</a:t>
             </a:r>
             <a:endParaRPr lang="en-US" dirty="0"/>
           </a:p>
           <a:p>
             <a:r>
-              <a:rPr lang="en-US" dirty="0" err="1" smtClean="0"/>
-              <a:t>Dagelijks</a:t>
-            </a:r>
-            <a:r>
-              <a:rPr lang="en-US" dirty="0" smtClean="0"/>
-              <a:t> </a:t>
-            </a:r>
-            <a:r>
-              <a:rPr lang="en-US" dirty="0" err="1"/>
-              <a:t>g</a:t>
-            </a:r>
-            <a:r>
-              <a:rPr lang="en-US" dirty="0" err="1" smtClean="0"/>
-              <a:t>eautomatiseerde</a:t>
-            </a:r>
-            <a:r>
-              <a:rPr lang="en-US" dirty="0" smtClean="0"/>
-              <a:t> </a:t>
-            </a:r>
-            <a:r>
-              <a:rPr lang="en-US" dirty="0" err="1" smtClean="0"/>
-              <a:t>vergelijking</a:t>
-            </a:r>
-            <a:endParaRPr lang="en-US" dirty="0"/>
-          </a:p>
-          <a:p>
-            <a:r>
               <a:rPr lang="en-US" dirty="0"/>
               <a:t>Database </a:t>
             </a:r>
             <a:r>
-              <a:rPr lang="en-US" dirty="0" err="1" smtClean="0"/>
+              <a:rPr lang="en-US" dirty="0" err="1"/>
               <a:t>onafhankelijk</a:t>
             </a:r>
             <a:endParaRPr lang="en-US" dirty="0"/>

</xml_diff>

<commit_message>
- aangepast voor de kickoff meeting
</commit_message>
<xml_diff>
--- a/doc/GegevensVergelijker.pptx
+++ b/doc/GegevensVergelijker.pptx
@@ -5,7 +5,7 @@
     <p:sldMasterId id="2147483648" r:id="rId1"/>
   </p:sldMasterIdLst>
   <p:notesMasterIdLst>
-    <p:notesMasterId r:id="rId12"/>
+    <p:notesMasterId r:id="rId18"/>
   </p:notesMasterIdLst>
   <p:sldIdLst>
     <p:sldId id="256" r:id="rId2"/>
@@ -18,6 +18,12 @@
     <p:sldId id="266" r:id="rId9"/>
     <p:sldId id="262" r:id="rId10"/>
     <p:sldId id="267" r:id="rId11"/>
+    <p:sldId id="268" r:id="rId12"/>
+    <p:sldId id="269" r:id="rId13"/>
+    <p:sldId id="270" r:id="rId14"/>
+    <p:sldId id="272" r:id="rId15"/>
+    <p:sldId id="273" r:id="rId16"/>
+    <p:sldId id="271" r:id="rId17"/>
   </p:sldIdLst>
   <p:sldSz cx="9144000" cy="6858000" type="screen4x3"/>
   <p:notesSz cx="6797675" cy="9926638"/>
@@ -217,7 +223,7 @@
           <a:p>
             <a:fld id="{FDF61A00-7724-43C7-AA18-3E7FB129AA0D}" type="datetimeFigureOut">
               <a:rPr lang="nl-NL" smtClean="0"/>
-              <a:t>12-9-2016</a:t>
+              <a:t>19-12-2016</a:t>
             </a:fld>
             <a:endParaRPr lang="nl-NL"/>
           </a:p>
@@ -2472,7 +2478,7 @@
           <a:p>
             <a:fld id="{8D547C02-3BDD-490E-A05C-F81512B41FDF}" type="datetimeFigureOut">
               <a:rPr lang="nl-NL" smtClean="0"/>
-              <a:t>12-9-2016</a:t>
+              <a:t>19-12-2016</a:t>
             </a:fld>
             <a:endParaRPr lang="nl-NL"/>
           </a:p>
@@ -2621,7 +2627,7 @@
           <a:p>
             <a:fld id="{8D547C02-3BDD-490E-A05C-F81512B41FDF}" type="datetimeFigureOut">
               <a:rPr lang="nl-NL" smtClean="0"/>
-              <a:t>12-9-2016</a:t>
+              <a:t>19-12-2016</a:t>
             </a:fld>
             <a:endParaRPr lang="nl-NL"/>
           </a:p>
@@ -2799,7 +2805,7 @@
           <a:p>
             <a:fld id="{8D547C02-3BDD-490E-A05C-F81512B41FDF}" type="datetimeFigureOut">
               <a:rPr lang="nl-NL" smtClean="0"/>
-              <a:t>12-9-2016</a:t>
+              <a:t>19-12-2016</a:t>
             </a:fld>
             <a:endParaRPr lang="nl-NL"/>
           </a:p>
@@ -2977,7 +2983,7 @@
           <a:p>
             <a:fld id="{8D547C02-3BDD-490E-A05C-F81512B41FDF}" type="datetimeFigureOut">
               <a:rPr lang="nl-NL" smtClean="0"/>
-              <a:t>12-9-2016</a:t>
+              <a:t>19-12-2016</a:t>
             </a:fld>
             <a:endParaRPr lang="nl-NL"/>
           </a:p>
@@ -3241,7 +3247,7 @@
           <a:p>
             <a:fld id="{8D547C02-3BDD-490E-A05C-F81512B41FDF}" type="datetimeFigureOut">
               <a:rPr lang="nl-NL" smtClean="0"/>
-              <a:t>12-9-2016</a:t>
+              <a:t>19-12-2016</a:t>
             </a:fld>
             <a:endParaRPr lang="nl-NL"/>
           </a:p>
@@ -3540,7 +3546,7 @@
           <a:p>
             <a:fld id="{8D547C02-3BDD-490E-A05C-F81512B41FDF}" type="datetimeFigureOut">
               <a:rPr lang="nl-NL" smtClean="0"/>
-              <a:t>12-9-2016</a:t>
+              <a:t>19-12-2016</a:t>
             </a:fld>
             <a:endParaRPr lang="nl-NL"/>
           </a:p>
@@ -3964,7 +3970,7 @@
           <a:p>
             <a:fld id="{8D547C02-3BDD-490E-A05C-F81512B41FDF}" type="datetimeFigureOut">
               <a:rPr lang="nl-NL" smtClean="0"/>
-              <a:t>12-9-2016</a:t>
+              <a:t>19-12-2016</a:t>
             </a:fld>
             <a:endParaRPr lang="nl-NL"/>
           </a:p>
@@ -4089,7 +4095,7 @@
           <a:p>
             <a:fld id="{8D547C02-3BDD-490E-A05C-F81512B41FDF}" type="datetimeFigureOut">
               <a:rPr lang="nl-NL" smtClean="0"/>
-              <a:t>12-9-2016</a:t>
+              <a:t>19-12-2016</a:t>
             </a:fld>
             <a:endParaRPr lang="nl-NL"/>
           </a:p>
@@ -4184,7 +4190,7 @@
           <a:p>
             <a:fld id="{8D547C02-3BDD-490E-A05C-F81512B41FDF}" type="datetimeFigureOut">
               <a:rPr lang="nl-NL" smtClean="0"/>
-              <a:t>12-9-2016</a:t>
+              <a:t>19-12-2016</a:t>
             </a:fld>
             <a:endParaRPr lang="nl-NL"/>
           </a:p>
@@ -4461,7 +4467,7 @@
           <a:p>
             <a:fld id="{8D547C02-3BDD-490E-A05C-F81512B41FDF}" type="datetimeFigureOut">
               <a:rPr lang="nl-NL" smtClean="0"/>
-              <a:t>12-9-2016</a:t>
+              <a:t>19-12-2016</a:t>
             </a:fld>
             <a:endParaRPr lang="nl-NL"/>
           </a:p>
@@ -4716,7 +4722,7 @@
           <a:p>
             <a:fld id="{8D547C02-3BDD-490E-A05C-F81512B41FDF}" type="datetimeFigureOut">
               <a:rPr lang="nl-NL" smtClean="0"/>
-              <a:t>12-9-2016</a:t>
+              <a:t>19-12-2016</a:t>
             </a:fld>
             <a:endParaRPr lang="nl-NL"/>
           </a:p>
@@ -4936,7 +4942,7 @@
           <a:p>
             <a:fld id="{8D547C02-3BDD-490E-A05C-F81512B41FDF}" type="datetimeFigureOut">
               <a:rPr lang="nl-NL" smtClean="0"/>
-              <a:t>12-9-2016</a:t>
+              <a:t>19-12-2016</a:t>
             </a:fld>
             <a:endParaRPr lang="nl-NL"/>
           </a:p>
@@ -5509,12 +5515,14 @@
         </p:nvSpPr>
         <p:spPr/>
         <p:txBody>
-          <a:bodyPr/>
+          <a:bodyPr>
+            <a:normAutofit fontScale="90000"/>
+          </a:bodyPr>
           <a:lstStyle/>
           <a:p>
             <a:r>
               <a:rPr lang="nl-NL" dirty="0"/>
-              <a:t>Mijn wens</a:t>
+              <a:t>Vragen op het Symposium Gegevensmanagement Gemeenten</a:t>
             </a:r>
             <a:endParaRPr lang="en-US" dirty="0"/>
           </a:p>
@@ -5538,9 +5546,18 @@
         </p:spPr>
         <p:txBody>
           <a:bodyPr>
-            <a:normAutofit fontScale="77500" lnSpcReduction="20000"/>
+            <a:normAutofit fontScale="70000" lnSpcReduction="20000"/>
           </a:bodyPr>
           <a:lstStyle/>
+          <a:p>
+            <a:r>
+              <a:rPr lang="nl-NL" dirty="0"/>
+              <a:t>Op 13 september</a:t>
+            </a:r>
+          </a:p>
+          <a:p>
+            <a:endParaRPr lang="en-US" dirty="0"/>
+          </a:p>
           <a:p>
             <a:r>
               <a:rPr lang="en-US" dirty="0" err="1"/>
@@ -5760,6 +5777,718 @@
     <p:extLst>
       <p:ext uri="{BB962C8B-B14F-4D97-AF65-F5344CB8AC3E}">
         <p14:creationId xmlns:p14="http://schemas.microsoft.com/office/powerpoint/2010/main" val="996323792"/>
+      </p:ext>
+    </p:extLst>
+  </p:cSld>
+  <p:clrMapOvr>
+    <a:masterClrMapping/>
+  </p:clrMapOvr>
+</p:sld>
+</file>
+
+<file path=ppt/slides/slide11.xml><?xml version="1.0" encoding="utf-8"?>
+<p:sld xmlns:a="http://schemas.openxmlformats.org/drawingml/2006/main" xmlns:r="http://schemas.openxmlformats.org/officeDocument/2006/relationships" xmlns:p="http://schemas.openxmlformats.org/presentationml/2006/main">
+  <p:cSld>
+    <p:spTree>
+      <p:nvGrpSpPr>
+        <p:cNvPr id="1" name=""/>
+        <p:cNvGrpSpPr/>
+        <p:nvPr/>
+      </p:nvGrpSpPr>
+      <p:grpSpPr>
+        <a:xfrm>
+          <a:off x="0" y="0"/>
+          <a:ext cx="0" cy="0"/>
+          <a:chOff x="0" y="0"/>
+          <a:chExt cx="0" cy="0"/>
+        </a:xfrm>
+      </p:grpSpPr>
+      <p:sp>
+        <p:nvSpPr>
+          <p:cNvPr id="2" name="Titel 1"/>
+          <p:cNvSpPr>
+            <a:spLocks noGrp="1"/>
+          </p:cNvSpPr>
+          <p:nvPr>
+            <p:ph type="title"/>
+          </p:nvPr>
+        </p:nvSpPr>
+        <p:spPr/>
+        <p:txBody>
+          <a:bodyPr/>
+          <a:lstStyle/>
+          <a:p>
+            <a:r>
+              <a:rPr lang="nl-NL" dirty="0"/>
+              <a:t>De pilotstarter</a:t>
+            </a:r>
+          </a:p>
+        </p:txBody>
+      </p:sp>
+      <p:sp>
+        <p:nvSpPr>
+          <p:cNvPr id="3" name="Tijdelijke aanduiding voor inhoud 2"/>
+          <p:cNvSpPr>
+            <a:spLocks noGrp="1"/>
+          </p:cNvSpPr>
+          <p:nvPr>
+            <p:ph idx="1"/>
+          </p:nvPr>
+        </p:nvSpPr>
+        <p:spPr/>
+        <p:txBody>
+          <a:bodyPr/>
+          <a:lstStyle/>
+          <a:p>
+            <a:r>
+              <a:rPr lang="nl-NL" dirty="0">
+                <a:hlinkClick r:id="rId2"/>
+              </a:rPr>
+              <a:t>De pilot starter: Gemeentelijke gegevens kwaliteit vergelijken</a:t>
+            </a:r>
+            <a:endParaRPr lang="nl-NL" dirty="0"/>
+          </a:p>
+          <a:p>
+            <a:pPr marL="0" indent="0">
+              <a:buNone/>
+            </a:pPr>
+            <a:endParaRPr lang="nl-NL" dirty="0"/>
+          </a:p>
+          <a:p>
+            <a:r>
+              <a:rPr lang="nl-NL" dirty="0">
+                <a:hlinkClick r:id="rId3"/>
+              </a:rPr>
+              <a:t>‘Gegevensmanagement is een kwestie van vergelijken’</a:t>
+            </a:r>
+            <a:endParaRPr lang="nl-NL" dirty="0"/>
+          </a:p>
+          <a:p>
+            <a:endParaRPr lang="nl-NL" dirty="0"/>
+          </a:p>
+          <a:p>
+            <a:r>
+              <a:rPr lang="nl-NL" dirty="0" err="1">
+                <a:hlinkClick r:id="rId4"/>
+              </a:rPr>
+              <a:t>Kickoff</a:t>
+            </a:r>
+            <a:r>
+              <a:rPr lang="nl-NL" dirty="0">
+                <a:hlinkClick r:id="rId4"/>
+              </a:rPr>
+              <a:t> bijeenkomst </a:t>
+            </a:r>
+            <a:endParaRPr lang="nl-NL" dirty="0"/>
+          </a:p>
+        </p:txBody>
+      </p:sp>
+    </p:spTree>
+    <p:extLst>
+      <p:ext uri="{BB962C8B-B14F-4D97-AF65-F5344CB8AC3E}">
+        <p14:creationId xmlns:p14="http://schemas.microsoft.com/office/powerpoint/2010/main" val="1720121241"/>
+      </p:ext>
+    </p:extLst>
+  </p:cSld>
+  <p:clrMapOvr>
+    <a:masterClrMapping/>
+  </p:clrMapOvr>
+</p:sld>
+</file>
+
+<file path=ppt/slides/slide12.xml><?xml version="1.0" encoding="utf-8"?>
+<p:sld xmlns:a="http://schemas.openxmlformats.org/drawingml/2006/main" xmlns:r="http://schemas.openxmlformats.org/officeDocument/2006/relationships" xmlns:p="http://schemas.openxmlformats.org/presentationml/2006/main">
+  <p:cSld>
+    <p:spTree>
+      <p:nvGrpSpPr>
+        <p:cNvPr id="1" name=""/>
+        <p:cNvGrpSpPr/>
+        <p:nvPr/>
+      </p:nvGrpSpPr>
+      <p:grpSpPr>
+        <a:xfrm>
+          <a:off x="0" y="0"/>
+          <a:ext cx="0" cy="0"/>
+          <a:chOff x="0" y="0"/>
+          <a:chExt cx="0" cy="0"/>
+        </a:xfrm>
+      </p:grpSpPr>
+      <p:sp>
+        <p:nvSpPr>
+          <p:cNvPr id="2" name="Titel 1"/>
+          <p:cNvSpPr>
+            <a:spLocks noGrp="1"/>
+          </p:cNvSpPr>
+          <p:nvPr>
+            <p:ph type="title"/>
+          </p:nvPr>
+        </p:nvSpPr>
+        <p:spPr/>
+        <p:txBody>
+          <a:bodyPr/>
+          <a:lstStyle/>
+          <a:p>
+            <a:r>
+              <a:rPr lang="en-US" dirty="0"/>
+              <a:t>Wat </a:t>
+            </a:r>
+            <a:r>
+              <a:rPr lang="en-US" dirty="0" err="1"/>
+              <a:t>willen</a:t>
+            </a:r>
+            <a:r>
+              <a:rPr lang="en-US" dirty="0"/>
+              <a:t> we </a:t>
+            </a:r>
+            <a:r>
+              <a:rPr lang="en-US" dirty="0" err="1"/>
+              <a:t>bereiken</a:t>
+            </a:r>
+            <a:endParaRPr lang="nl-NL" dirty="0"/>
+          </a:p>
+        </p:txBody>
+      </p:sp>
+      <p:sp>
+        <p:nvSpPr>
+          <p:cNvPr id="3" name="Tijdelijke aanduiding voor inhoud 2"/>
+          <p:cNvSpPr>
+            <a:spLocks noGrp="1"/>
+          </p:cNvSpPr>
+          <p:nvPr>
+            <p:ph idx="1"/>
+          </p:nvPr>
+        </p:nvSpPr>
+        <p:spPr/>
+        <p:txBody>
+          <a:bodyPr/>
+          <a:lstStyle/>
+          <a:p>
+            <a:r>
+              <a:rPr lang="nl-NL" dirty="0"/>
+              <a:t>Benchmarking met gemeenten</a:t>
+            </a:r>
+          </a:p>
+          <a:p>
+            <a:r>
+              <a:rPr lang="nl-NL" dirty="0"/>
+              <a:t>Samenwerken met gemeenten</a:t>
+            </a:r>
+          </a:p>
+          <a:p>
+            <a:r>
+              <a:rPr lang="nl-NL" dirty="0"/>
+              <a:t>Dialoog over wat </a:t>
+            </a:r>
+            <a:r>
+              <a:rPr lang="nl-NL" dirty="0" err="1"/>
+              <a:t>reeële</a:t>
+            </a:r>
+            <a:r>
+              <a:rPr lang="nl-NL" dirty="0"/>
+              <a:t> percentages zijn.</a:t>
+            </a:r>
+          </a:p>
+          <a:p>
+            <a:r>
+              <a:rPr lang="nl-NL" dirty="0"/>
+              <a:t>Hoe en wat kunnen we van elkaar leren.</a:t>
+            </a:r>
+            <a:br>
+              <a:rPr lang="nl-NL" dirty="0"/>
+            </a:br>
+            <a:endParaRPr lang="nl-NL" dirty="0"/>
+          </a:p>
+        </p:txBody>
+      </p:sp>
+    </p:spTree>
+    <p:extLst>
+      <p:ext uri="{BB962C8B-B14F-4D97-AF65-F5344CB8AC3E}">
+        <p14:creationId xmlns:p14="http://schemas.microsoft.com/office/powerpoint/2010/main" val="854420395"/>
+      </p:ext>
+    </p:extLst>
+  </p:cSld>
+  <p:clrMapOvr>
+    <a:masterClrMapping/>
+  </p:clrMapOvr>
+</p:sld>
+</file>
+
+<file path=ppt/slides/slide13.xml><?xml version="1.0" encoding="utf-8"?>
+<p:sld xmlns:a="http://schemas.openxmlformats.org/drawingml/2006/main" xmlns:r="http://schemas.openxmlformats.org/officeDocument/2006/relationships" xmlns:p="http://schemas.openxmlformats.org/presentationml/2006/main">
+  <p:cSld>
+    <p:spTree>
+      <p:nvGrpSpPr>
+        <p:cNvPr id="1" name=""/>
+        <p:cNvGrpSpPr/>
+        <p:nvPr/>
+      </p:nvGrpSpPr>
+      <p:grpSpPr>
+        <a:xfrm>
+          <a:off x="0" y="0"/>
+          <a:ext cx="0" cy="0"/>
+          <a:chOff x="0" y="0"/>
+          <a:chExt cx="0" cy="0"/>
+        </a:xfrm>
+      </p:grpSpPr>
+      <p:sp>
+        <p:nvSpPr>
+          <p:cNvPr id="2" name="Titel 1"/>
+          <p:cNvSpPr>
+            <a:spLocks noGrp="1"/>
+          </p:cNvSpPr>
+          <p:nvPr>
+            <p:ph type="title"/>
+          </p:nvPr>
+        </p:nvSpPr>
+        <p:spPr/>
+        <p:txBody>
+          <a:bodyPr>
+            <a:normAutofit/>
+          </a:bodyPr>
+          <a:lstStyle/>
+          <a:p>
+            <a:r>
+              <a:rPr lang="nl-NL" dirty="0"/>
+              <a:t>Wat vragen we?</a:t>
+            </a:r>
+          </a:p>
+        </p:txBody>
+      </p:sp>
+      <p:sp>
+        <p:nvSpPr>
+          <p:cNvPr id="3" name="Tijdelijke aanduiding voor inhoud 2"/>
+          <p:cNvSpPr>
+            <a:spLocks noGrp="1"/>
+          </p:cNvSpPr>
+          <p:nvPr>
+            <p:ph idx="1"/>
+          </p:nvPr>
+        </p:nvSpPr>
+        <p:spPr/>
+        <p:txBody>
+          <a:bodyPr>
+            <a:normAutofit lnSpcReduction="10000"/>
+          </a:bodyPr>
+          <a:lstStyle/>
+          <a:p>
+            <a:r>
+              <a:rPr lang="nl-NL" dirty="0"/>
+              <a:t>Vergelijkingen regelmatig draaien</a:t>
+            </a:r>
+          </a:p>
+          <a:p>
+            <a:r>
+              <a:rPr lang="nl-NL" dirty="0"/>
+              <a:t>Vergelijkingsresultaten delen</a:t>
+            </a:r>
+          </a:p>
+          <a:p>
+            <a:r>
+              <a:rPr lang="nl-NL" dirty="0"/>
+              <a:t>Eigen vergelijkingen delen</a:t>
+            </a:r>
+          </a:p>
+          <a:p>
+            <a:r>
+              <a:rPr lang="nl-NL" dirty="0"/>
+              <a:t>Aanpassingen op vergelijkingen delen</a:t>
+            </a:r>
+          </a:p>
+          <a:p>
+            <a:r>
+              <a:rPr lang="nl-NL" dirty="0"/>
+              <a:t>Actief meedenken</a:t>
+            </a:r>
+          </a:p>
+          <a:p>
+            <a:endParaRPr lang="nl-NL" dirty="0"/>
+          </a:p>
+          <a:p>
+            <a:r>
+              <a:rPr lang="nl-NL" dirty="0"/>
+              <a:t>Maandelijks 1-dag totaal (voorstel)</a:t>
+            </a:r>
+          </a:p>
+          <a:p>
+            <a:pPr lvl="1"/>
+            <a:r>
+              <a:rPr lang="nl-NL" dirty="0"/>
+              <a:t>2 dagdelen </a:t>
+            </a:r>
+          </a:p>
+          <a:p>
+            <a:endParaRPr lang="nl-NL" dirty="0"/>
+          </a:p>
+          <a:p>
+            <a:pPr marL="457200" lvl="1" indent="0">
+              <a:buNone/>
+            </a:pPr>
+            <a:endParaRPr lang="nl-NL" dirty="0"/>
+          </a:p>
+          <a:p>
+            <a:pPr marL="457200" lvl="1" indent="0">
+              <a:buNone/>
+            </a:pPr>
+            <a:endParaRPr lang="nl-NL" dirty="0"/>
+          </a:p>
+          <a:p>
+            <a:pPr marL="0" indent="0">
+              <a:buNone/>
+            </a:pPr>
+            <a:endParaRPr lang="nl-NL" dirty="0"/>
+          </a:p>
+        </p:txBody>
+      </p:sp>
+    </p:spTree>
+    <p:extLst>
+      <p:ext uri="{BB962C8B-B14F-4D97-AF65-F5344CB8AC3E}">
+        <p14:creationId xmlns:p14="http://schemas.microsoft.com/office/powerpoint/2010/main" val="2003286372"/>
+      </p:ext>
+    </p:extLst>
+  </p:cSld>
+  <p:clrMapOvr>
+    <a:masterClrMapping/>
+  </p:clrMapOvr>
+</p:sld>
+</file>
+
+<file path=ppt/slides/slide14.xml><?xml version="1.0" encoding="utf-8"?>
+<p:sld xmlns:a="http://schemas.openxmlformats.org/drawingml/2006/main" xmlns:r="http://schemas.openxmlformats.org/officeDocument/2006/relationships" xmlns:p="http://schemas.openxmlformats.org/presentationml/2006/main">
+  <p:cSld>
+    <p:spTree>
+      <p:nvGrpSpPr>
+        <p:cNvPr id="1" name=""/>
+        <p:cNvGrpSpPr/>
+        <p:nvPr/>
+      </p:nvGrpSpPr>
+      <p:grpSpPr>
+        <a:xfrm>
+          <a:off x="0" y="0"/>
+          <a:ext cx="0" cy="0"/>
+          <a:chOff x="0" y="0"/>
+          <a:chExt cx="0" cy="0"/>
+        </a:xfrm>
+      </p:grpSpPr>
+      <p:sp>
+        <p:nvSpPr>
+          <p:cNvPr id="2" name="Titel 1"/>
+          <p:cNvSpPr>
+            <a:spLocks noGrp="1"/>
+          </p:cNvSpPr>
+          <p:nvPr>
+            <p:ph type="title"/>
+          </p:nvPr>
+        </p:nvSpPr>
+        <p:spPr/>
+        <p:txBody>
+          <a:bodyPr/>
+          <a:lstStyle/>
+          <a:p>
+            <a:r>
+              <a:rPr lang="nl-NL" dirty="0"/>
+              <a:t>Planning op de website</a:t>
+            </a:r>
+          </a:p>
+        </p:txBody>
+      </p:sp>
+      <p:sp>
+        <p:nvSpPr>
+          <p:cNvPr id="3" name="Tijdelijke aanduiding voor inhoud 2"/>
+          <p:cNvSpPr>
+            <a:spLocks noGrp="1"/>
+          </p:cNvSpPr>
+          <p:nvPr>
+            <p:ph idx="1"/>
+          </p:nvPr>
+        </p:nvSpPr>
+        <p:spPr/>
+        <p:txBody>
+          <a:bodyPr>
+            <a:normAutofit fontScale="77500" lnSpcReduction="20000"/>
+          </a:bodyPr>
+          <a:lstStyle/>
+          <a:p>
+            <a:r>
+              <a:rPr lang="nl-NL" b="1" dirty="0"/>
+              <a:t>Mijlpalen</a:t>
+            </a:r>
+          </a:p>
+          <a:p>
+            <a:r>
+              <a:rPr lang="nl-NL" dirty="0"/>
+              <a:t>1 Deelnemers bekend.</a:t>
+            </a:r>
+          </a:p>
+          <a:p>
+            <a:r>
+              <a:rPr lang="nl-NL" dirty="0"/>
+              <a:t>2 </a:t>
+            </a:r>
+            <a:r>
+              <a:rPr lang="nl-NL" dirty="0" err="1"/>
+              <a:t>Kickoff</a:t>
+            </a:r>
+            <a:r>
+              <a:rPr lang="nl-NL" dirty="0"/>
+              <a:t> meeting : kennis delen en verwachtingen afstemmen.</a:t>
+            </a:r>
+          </a:p>
+          <a:p>
+            <a:r>
+              <a:rPr lang="nl-NL" dirty="0"/>
+              <a:t>3 Proef-vergelijking maken.</a:t>
+            </a:r>
+          </a:p>
+          <a:p>
+            <a:r>
+              <a:rPr lang="nl-NL" dirty="0"/>
+              <a:t>4 Proef vergelijking draaien bij meerder gemeenten.</a:t>
+            </a:r>
+          </a:p>
+          <a:p>
+            <a:r>
+              <a:rPr lang="nl-NL" dirty="0"/>
+              <a:t>5 Vergelijkingen afstemmen.</a:t>
+            </a:r>
+          </a:p>
+          <a:p>
+            <a:r>
+              <a:rPr lang="nl-NL" dirty="0"/>
+              <a:t>6 Vergelijkingen draaien bij meerdere gemeenten.</a:t>
+            </a:r>
+          </a:p>
+          <a:p>
+            <a:r>
+              <a:rPr lang="nl-NL" dirty="0"/>
+              <a:t>7 Beheer inregelen op de infrastructuur.</a:t>
+            </a:r>
+          </a:p>
+          <a:p>
+            <a:r>
+              <a:rPr lang="nl-NL" dirty="0"/>
+              <a:t>8 Resultaten presenteren na bepaalde tijd.</a:t>
+            </a:r>
+          </a:p>
+        </p:txBody>
+      </p:sp>
+    </p:spTree>
+    <p:extLst>
+      <p:ext uri="{BB962C8B-B14F-4D97-AF65-F5344CB8AC3E}">
+        <p14:creationId xmlns:p14="http://schemas.microsoft.com/office/powerpoint/2010/main" val="984290856"/>
+      </p:ext>
+    </p:extLst>
+  </p:cSld>
+  <p:clrMapOvr>
+    <a:masterClrMapping/>
+  </p:clrMapOvr>
+</p:sld>
+</file>
+
+<file path=ppt/slides/slide15.xml><?xml version="1.0" encoding="utf-8"?>
+<p:sld xmlns:a="http://schemas.openxmlformats.org/drawingml/2006/main" xmlns:r="http://schemas.openxmlformats.org/officeDocument/2006/relationships" xmlns:p="http://schemas.openxmlformats.org/presentationml/2006/main">
+  <p:cSld>
+    <p:spTree>
+      <p:nvGrpSpPr>
+        <p:cNvPr id="1" name=""/>
+        <p:cNvGrpSpPr/>
+        <p:nvPr/>
+      </p:nvGrpSpPr>
+      <p:grpSpPr>
+        <a:xfrm>
+          <a:off x="0" y="0"/>
+          <a:ext cx="0" cy="0"/>
+          <a:chOff x="0" y="0"/>
+          <a:chExt cx="0" cy="0"/>
+        </a:xfrm>
+      </p:grpSpPr>
+      <p:sp>
+        <p:nvSpPr>
+          <p:cNvPr id="2" name="Titel 1"/>
+          <p:cNvSpPr>
+            <a:spLocks noGrp="1"/>
+          </p:cNvSpPr>
+          <p:nvPr>
+            <p:ph type="title"/>
+          </p:nvPr>
+        </p:nvSpPr>
+        <p:spPr/>
+        <p:txBody>
+          <a:bodyPr>
+            <a:normAutofit/>
+          </a:bodyPr>
+          <a:lstStyle/>
+          <a:p>
+            <a:r>
+              <a:rPr lang="nl-NL" dirty="0"/>
+              <a:t>Wat zijn jullie </a:t>
+            </a:r>
+            <a:r>
+              <a:rPr lang="nl-NL" dirty="0" err="1"/>
+              <a:t>verwachingen</a:t>
+            </a:r>
+            <a:r>
+              <a:rPr lang="nl-NL" dirty="0"/>
+              <a:t>?</a:t>
+            </a:r>
+          </a:p>
+        </p:txBody>
+      </p:sp>
+      <p:sp>
+        <p:nvSpPr>
+          <p:cNvPr id="3" name="Tijdelijke aanduiding voor inhoud 2"/>
+          <p:cNvSpPr>
+            <a:spLocks noGrp="1"/>
+          </p:cNvSpPr>
+          <p:nvPr>
+            <p:ph idx="1"/>
+          </p:nvPr>
+        </p:nvSpPr>
+        <p:spPr/>
+        <p:txBody>
+          <a:bodyPr/>
+          <a:lstStyle/>
+          <a:p>
+            <a:endParaRPr lang="nl-NL" dirty="0"/>
+          </a:p>
+        </p:txBody>
+      </p:sp>
+    </p:spTree>
+    <p:extLst>
+      <p:ext uri="{BB962C8B-B14F-4D97-AF65-F5344CB8AC3E}">
+        <p14:creationId xmlns:p14="http://schemas.microsoft.com/office/powerpoint/2010/main" val="883375278"/>
+      </p:ext>
+    </p:extLst>
+  </p:cSld>
+  <p:clrMapOvr>
+    <a:masterClrMapping/>
+  </p:clrMapOvr>
+</p:sld>
+</file>
+
+<file path=ppt/slides/slide16.xml><?xml version="1.0" encoding="utf-8"?>
+<p:sld xmlns:a="http://schemas.openxmlformats.org/drawingml/2006/main" xmlns:r="http://schemas.openxmlformats.org/officeDocument/2006/relationships" xmlns:p="http://schemas.openxmlformats.org/presentationml/2006/main">
+  <p:cSld>
+    <p:spTree>
+      <p:nvGrpSpPr>
+        <p:cNvPr id="1" name=""/>
+        <p:cNvGrpSpPr/>
+        <p:nvPr/>
+      </p:nvGrpSpPr>
+      <p:grpSpPr>
+        <a:xfrm>
+          <a:off x="0" y="0"/>
+          <a:ext cx="0" cy="0"/>
+          <a:chOff x="0" y="0"/>
+          <a:chExt cx="0" cy="0"/>
+        </a:xfrm>
+      </p:grpSpPr>
+      <p:sp>
+        <p:nvSpPr>
+          <p:cNvPr id="2" name="Titel 1"/>
+          <p:cNvSpPr>
+            <a:spLocks noGrp="1"/>
+          </p:cNvSpPr>
+          <p:nvPr>
+            <p:ph type="title"/>
+          </p:nvPr>
+        </p:nvSpPr>
+        <p:spPr/>
+        <p:txBody>
+          <a:bodyPr>
+            <a:normAutofit/>
+          </a:bodyPr>
+          <a:lstStyle/>
+          <a:p>
+            <a:r>
+              <a:rPr lang="nl-NL" dirty="0"/>
+              <a:t>Wat kunnen wij bieden</a:t>
+            </a:r>
+          </a:p>
+        </p:txBody>
+      </p:sp>
+      <p:sp>
+        <p:nvSpPr>
+          <p:cNvPr id="3" name="Tijdelijke aanduiding voor inhoud 2"/>
+          <p:cNvSpPr>
+            <a:spLocks noGrp="1"/>
+          </p:cNvSpPr>
+          <p:nvPr>
+            <p:ph idx="1"/>
+          </p:nvPr>
+        </p:nvSpPr>
+        <p:spPr/>
+        <p:txBody>
+          <a:bodyPr>
+            <a:normAutofit lnSpcReduction="10000"/>
+          </a:bodyPr>
+          <a:lstStyle/>
+          <a:p>
+            <a:r>
+              <a:rPr lang="nl-NL" dirty="0"/>
+              <a:t>Rapportage</a:t>
+            </a:r>
+          </a:p>
+          <a:p>
+            <a:pPr lvl="1"/>
+            <a:r>
+              <a:rPr lang="nl-NL" dirty="0"/>
+              <a:t>Ervaringen</a:t>
+            </a:r>
+          </a:p>
+          <a:p>
+            <a:pPr lvl="1"/>
+            <a:r>
+              <a:rPr lang="nl-NL" dirty="0"/>
+              <a:t>Percentages</a:t>
+            </a:r>
+          </a:p>
+          <a:p>
+            <a:r>
+              <a:rPr lang="nl-NL" dirty="0"/>
+              <a:t>SQL</a:t>
+            </a:r>
+          </a:p>
+          <a:p>
+            <a:pPr lvl="1"/>
+            <a:r>
+              <a:rPr lang="nl-NL" dirty="0"/>
+              <a:t>Kennis</a:t>
+            </a:r>
+          </a:p>
+          <a:p>
+            <a:pPr lvl="1"/>
+            <a:r>
+              <a:rPr lang="nl-NL" dirty="0"/>
+              <a:t>Vergelijkingen</a:t>
+            </a:r>
+          </a:p>
+          <a:p>
+            <a:r>
+              <a:rPr lang="nl-NL" dirty="0" err="1"/>
+              <a:t>Tooling</a:t>
+            </a:r>
+            <a:endParaRPr lang="nl-NL" dirty="0"/>
+          </a:p>
+          <a:p>
+            <a:pPr lvl="1"/>
+            <a:r>
+              <a:rPr lang="nl-NL" dirty="0"/>
+              <a:t>Sourcecode</a:t>
+            </a:r>
+          </a:p>
+          <a:p>
+            <a:pPr lvl="1"/>
+            <a:r>
+              <a:rPr lang="nl-NL" dirty="0"/>
+              <a:t>Kennis</a:t>
+            </a:r>
+          </a:p>
+        </p:txBody>
+      </p:sp>
+    </p:spTree>
+    <p:extLst>
+      <p:ext uri="{BB962C8B-B14F-4D97-AF65-F5344CB8AC3E}">
+        <p14:creationId xmlns:p14="http://schemas.microsoft.com/office/powerpoint/2010/main" val="2213748778"/>
       </p:ext>
     </p:extLst>
   </p:cSld>

</xml_diff>